<commit_message>
add video url to intro.pdf
</commit_message>
<xml_diff>
--- a/chapter_1/pptx/1_intro.pptx
+++ b/chapter_1/pptx/1_intro.pptx
@@ -7,32 +7,33 @@
     <p:sldMasterId id="2147483664" r:id="rId3"/>
   </p:sldMasterIdLst>
   <p:notesMasterIdLst>
-    <p:notesMasterId r:id="rId27"/>
+    <p:notesMasterId r:id="rId28"/>
   </p:notesMasterIdLst>
   <p:sldIdLst>
     <p:sldId id="258" r:id="rId4"/>
     <p:sldId id="300" r:id="rId5"/>
-    <p:sldId id="267" r:id="rId6"/>
-    <p:sldId id="314" r:id="rId7"/>
-    <p:sldId id="325" r:id="rId8"/>
-    <p:sldId id="323" r:id="rId9"/>
-    <p:sldId id="315" r:id="rId10"/>
-    <p:sldId id="274" r:id="rId11"/>
-    <p:sldId id="322" r:id="rId12"/>
-    <p:sldId id="316" r:id="rId13"/>
-    <p:sldId id="302" r:id="rId14"/>
-    <p:sldId id="303" r:id="rId15"/>
-    <p:sldId id="309" r:id="rId16"/>
-    <p:sldId id="306" r:id="rId17"/>
-    <p:sldId id="311" r:id="rId18"/>
-    <p:sldId id="292" r:id="rId19"/>
-    <p:sldId id="312" r:id="rId20"/>
-    <p:sldId id="313" r:id="rId21"/>
-    <p:sldId id="317" r:id="rId22"/>
-    <p:sldId id="320" r:id="rId23"/>
-    <p:sldId id="326" r:id="rId24"/>
-    <p:sldId id="329" r:id="rId25"/>
-    <p:sldId id="330" r:id="rId26"/>
+    <p:sldId id="331" r:id="rId6"/>
+    <p:sldId id="267" r:id="rId7"/>
+    <p:sldId id="314" r:id="rId8"/>
+    <p:sldId id="325" r:id="rId9"/>
+    <p:sldId id="323" r:id="rId10"/>
+    <p:sldId id="315" r:id="rId11"/>
+    <p:sldId id="274" r:id="rId12"/>
+    <p:sldId id="322" r:id="rId13"/>
+    <p:sldId id="316" r:id="rId14"/>
+    <p:sldId id="302" r:id="rId15"/>
+    <p:sldId id="303" r:id="rId16"/>
+    <p:sldId id="309" r:id="rId17"/>
+    <p:sldId id="306" r:id="rId18"/>
+    <p:sldId id="311" r:id="rId19"/>
+    <p:sldId id="292" r:id="rId20"/>
+    <p:sldId id="312" r:id="rId21"/>
+    <p:sldId id="313" r:id="rId22"/>
+    <p:sldId id="317" r:id="rId23"/>
+    <p:sldId id="320" r:id="rId24"/>
+    <p:sldId id="326" r:id="rId25"/>
+    <p:sldId id="329" r:id="rId26"/>
+    <p:sldId id="330" r:id="rId27"/>
   </p:sldIdLst>
   <p:sldSz cx="18288000" cy="10285413"/>
   <p:notesSz cx="6858000" cy="9144000"/>
@@ -232,7 +233,7 @@
           <a:p>
             <a:fld id="{9325ABCC-732D-4DFB-BF35-D5B0D3F49F74}" type="datetimeFigureOut">
               <a:rPr kumimoji="1" lang="ja-JP" altLang="en-US" smtClean="0"/>
-              <a:t>2020/5/31</a:t>
+              <a:t>2020/6/11</a:t>
             </a:fld>
             <a:endParaRPr kumimoji="1" lang="ja-JP" altLang="en-US"/>
           </a:p>
@@ -12373,6 +12374,263 @@
       </p:grpSpPr>
       <p:sp>
         <p:nvSpPr>
+          <p:cNvPr id="9" name="タイトル 8"/>
+          <p:cNvSpPr>
+            <a:spLocks noGrp="1"/>
+          </p:cNvSpPr>
+          <p:nvPr>
+            <p:ph type="title"/>
+          </p:nvPr>
+        </p:nvSpPr>
+        <p:spPr/>
+        <p:txBody>
+          <a:bodyPr/>
+          <a:lstStyle/>
+          <a:p>
+            <a:r>
+              <a:rPr kumimoji="1" lang="ja" altLang="en-US" dirty="0"/>
+              <a:t>データアントレプレナー</a:t>
+            </a:r>
+            <a:r>
+              <a:rPr kumimoji="1" lang="ja-JP" altLang="en-US"/>
+              <a:t>フェロープログラム（</a:t>
+            </a:r>
+            <a:r>
+              <a:rPr kumimoji="1" lang="en-US" altLang="ja-JP" dirty="0" err="1"/>
+              <a:t>Defp</a:t>
+            </a:r>
+            <a:r>
+              <a:rPr kumimoji="1" lang="ja-JP" altLang="en-US"/>
+              <a:t>）</a:t>
+            </a:r>
+            <a:r>
+              <a:rPr kumimoji="1" lang="en-US" altLang="ja-JP" dirty="0"/>
+              <a:t> | </a:t>
+            </a:r>
+            <a:r>
+              <a:rPr lang="ja-JP" altLang="en-US"/>
+              <a:t>講義内容</a:t>
+            </a:r>
+            <a:endParaRPr kumimoji="1" lang="ja-JP" altLang="en-US" dirty="0"/>
+          </a:p>
+        </p:txBody>
+      </p:sp>
+      <p:sp>
+        <p:nvSpPr>
+          <p:cNvPr id="10" name="テキスト プレースホルダー 9"/>
+          <p:cNvSpPr>
+            <a:spLocks noGrp="1"/>
+          </p:cNvSpPr>
+          <p:nvPr>
+            <p:ph type="body" sz="quarter" idx="12"/>
+          </p:nvPr>
+        </p:nvSpPr>
+        <p:spPr>
+          <a:xfrm>
+            <a:off x="2670361" y="1420977"/>
+            <a:ext cx="13201277" cy="8600285"/>
+          </a:xfrm>
+        </p:spPr>
+        <p:txBody>
+          <a:bodyPr>
+            <a:normAutofit/>
+          </a:bodyPr>
+          <a:lstStyle/>
+          <a:p>
+            <a:r>
+              <a:rPr lang="ja" altLang="en-US" sz="4400" dirty="0"/>
+              <a:t>データアントレプレナー</a:t>
+            </a:r>
+            <a:r>
+              <a:rPr lang="ja-JP" altLang="en-US" sz="4400"/>
+              <a:t>実践論</a:t>
+            </a:r>
+            <a:endParaRPr lang="en-US" altLang="ja-JP" sz="4400" dirty="0"/>
+          </a:p>
+          <a:p>
+            <a:pPr lvl="1"/>
+            <a:r>
+              <a:rPr lang="ja-JP" altLang="en-US" sz="3600"/>
+              <a:t>各企業が</a:t>
+            </a:r>
+            <a:r>
+              <a:rPr lang="ja" altLang="en-US" sz="3600" dirty="0"/>
+              <a:t>行なっている</a:t>
+            </a:r>
+            <a:r>
+              <a:rPr lang="ja-JP" altLang="en-US" sz="3600"/>
+              <a:t>データビジネスの実例を学ぶ</a:t>
+            </a:r>
+            <a:endParaRPr lang="en-US" altLang="ja-JP" sz="3600" dirty="0"/>
+          </a:p>
+          <a:p>
+            <a:pPr lvl="1"/>
+            <a:r>
+              <a:rPr lang="ja-JP" altLang="en-US" sz="3600"/>
+              <a:t>最終コマで</a:t>
+            </a:r>
+            <a:r>
+              <a:rPr lang="ja" altLang="en-US" sz="3600" dirty="0"/>
+              <a:t>ピッチコンテスト</a:t>
+            </a:r>
+            <a:r>
+              <a:rPr lang="ja-JP" altLang="en-US" sz="3600"/>
+              <a:t>を行う</a:t>
+            </a:r>
+            <a:endParaRPr lang="en-US" altLang="ja-JP" sz="3600" dirty="0"/>
+          </a:p>
+          <a:p>
+            <a:pPr lvl="2"/>
+            <a:r>
+              <a:rPr lang="ja-JP" altLang="en-US" sz="3600"/>
+              <a:t>データを活用したビジネスプランを提言するコンテスト</a:t>
+            </a:r>
+            <a:endParaRPr lang="en-US" altLang="ja-JP" sz="3600" dirty="0"/>
+          </a:p>
+          <a:p>
+            <a:pPr lvl="2"/>
+            <a:endParaRPr lang="en-US" altLang="ja-JP" sz="3600" dirty="0"/>
+          </a:p>
+          <a:p>
+            <a:r>
+              <a:rPr lang="ja-JP" altLang="en-US" sz="4400"/>
+              <a:t>データサイエンティスト特論</a:t>
+            </a:r>
+            <a:endParaRPr lang="en-US" altLang="ja-JP" sz="4400" dirty="0"/>
+          </a:p>
+          <a:p>
+            <a:pPr lvl="1"/>
+            <a:r>
+              <a:rPr lang="ja" altLang="en-US" sz="3600" dirty="0"/>
+              <a:t>不動産データ</a:t>
+            </a:r>
+            <a:r>
+              <a:rPr lang="ja-JP" altLang="en-US" sz="3600"/>
+              <a:t>の分析，機械学習モデル（</a:t>
+            </a:r>
+            <a:r>
+              <a:rPr lang="en-US" altLang="ja-JP" sz="3600" dirty="0"/>
+              <a:t>AI</a:t>
+            </a:r>
+            <a:r>
+              <a:rPr lang="ja-JP" altLang="en-US" sz="3600"/>
+              <a:t>エンジン）の実装</a:t>
+            </a:r>
+            <a:endParaRPr lang="en-US" altLang="ja-JP" sz="3600" dirty="0"/>
+          </a:p>
+          <a:p>
+            <a:pPr lvl="2"/>
+            <a:r>
+              <a:rPr lang="ja-JP" altLang="en-US" sz="3600"/>
+              <a:t>物件価格</a:t>
+            </a:r>
+            <a:r>
+              <a:rPr lang="ja" altLang="en-US" sz="3600" dirty="0"/>
+              <a:t>予測モデルの</a:t>
+            </a:r>
+            <a:r>
+              <a:rPr lang="ja-JP" altLang="en-US" sz="3600"/>
+              <a:t>精度を競うコンペティションを行う</a:t>
+            </a:r>
+            <a:endParaRPr lang="en-US" altLang="ja-JP" sz="3600" dirty="0"/>
+          </a:p>
+          <a:p>
+            <a:pPr lvl="1"/>
+            <a:endParaRPr kumimoji="1" lang="en-US" altLang="ja" dirty="0"/>
+          </a:p>
+        </p:txBody>
+      </p:sp>
+      <p:sp>
+        <p:nvSpPr>
+          <p:cNvPr id="34" name="Slide Number Placeholder 33">
+            <a:extLst>
+              <a:ext uri="{FF2B5EF4-FFF2-40B4-BE49-F238E27FC236}">
+                <a16:creationId xmlns:a16="http://schemas.microsoft.com/office/drawing/2014/main" id="{9D5F9A3D-C521-1649-A724-230DE88284DF}"/>
+              </a:ext>
+            </a:extLst>
+          </p:cNvPr>
+          <p:cNvSpPr>
+            <a:spLocks noGrp="1"/>
+          </p:cNvSpPr>
+          <p:nvPr>
+            <p:ph type="sldNum" sz="quarter" idx="10"/>
+          </p:nvPr>
+        </p:nvSpPr>
+        <p:spPr/>
+        <p:txBody>
+          <a:bodyPr/>
+          <a:lstStyle/>
+          <a:p>
+            <a:fld id="{D28C7C6D-0F52-4FBA-8358-35C6083C2133}" type="slidenum">
+              <a:rPr kumimoji="1" lang="ja-JP" altLang="en-US" smtClean="0"/>
+              <a:pPr/>
+              <a:t>10</a:t>
+            </a:fld>
+            <a:endParaRPr kumimoji="1" lang="ja-JP" altLang="en-US"/>
+          </a:p>
+        </p:txBody>
+      </p:sp>
+      <p:sp>
+        <p:nvSpPr>
+          <p:cNvPr id="35" name="Footer Placeholder 34">
+            <a:extLst>
+              <a:ext uri="{FF2B5EF4-FFF2-40B4-BE49-F238E27FC236}">
+                <a16:creationId xmlns:a16="http://schemas.microsoft.com/office/drawing/2014/main" id="{9CA800DD-9063-F844-BBC3-914B9C2CF664}"/>
+              </a:ext>
+            </a:extLst>
+          </p:cNvPr>
+          <p:cNvSpPr>
+            <a:spLocks noGrp="1"/>
+          </p:cNvSpPr>
+          <p:nvPr>
+            <p:ph type="ftr" sz="quarter" idx="11"/>
+          </p:nvPr>
+        </p:nvSpPr>
+        <p:spPr/>
+        <p:txBody>
+          <a:bodyPr/>
+          <a:lstStyle/>
+          <a:p>
+            <a:r>
+              <a:rPr kumimoji="1" lang="en-US" altLang="ja-JP"/>
+              <a:t>@Takato Matsumoto, 2020</a:t>
+            </a:r>
+            <a:endParaRPr kumimoji="1" lang="ja-JP" altLang="en-US" dirty="0"/>
+          </a:p>
+        </p:txBody>
+      </p:sp>
+    </p:spTree>
+    <p:extLst>
+      <p:ext uri="{BB962C8B-B14F-4D97-AF65-F5344CB8AC3E}">
+        <p14:creationId xmlns:p14="http://schemas.microsoft.com/office/powerpoint/2010/main" val="1863008372"/>
+      </p:ext>
+    </p:extLst>
+  </p:cSld>
+  <p:clrMapOvr>
+    <a:masterClrMapping/>
+  </p:clrMapOvr>
+</p:sld>
+</file>
+
+<file path=ppt/slides/slide11.xml><?xml version="1.0" encoding="utf-8"?>
+<p:sld xmlns:a="http://schemas.openxmlformats.org/drawingml/2006/main" xmlns:r="http://schemas.openxmlformats.org/officeDocument/2006/relationships" xmlns:p="http://schemas.openxmlformats.org/presentationml/2006/main">
+  <p:cSld>
+    <p:spTree>
+      <p:nvGrpSpPr>
+        <p:cNvPr id="1" name=""/>
+        <p:cNvGrpSpPr/>
+        <p:nvPr/>
+      </p:nvGrpSpPr>
+      <p:grpSpPr>
+        <a:xfrm>
+          <a:off x="0" y="0"/>
+          <a:ext cx="0" cy="0"/>
+          <a:chOff x="0" y="0"/>
+          <a:chExt cx="0" cy="0"/>
+        </a:xfrm>
+      </p:grpSpPr>
+      <p:sp>
+        <p:nvSpPr>
           <p:cNvPr id="5" name="タイトル 4"/>
           <p:cNvSpPr>
             <a:spLocks noGrp="1"/>
@@ -12501,7 +12759,7 @@
             <a:fld id="{D28C7C6D-0F52-4FBA-8358-35C6083C2133}" type="slidenum">
               <a:rPr kumimoji="1" lang="ja-JP" altLang="en-US" smtClean="0"/>
               <a:pPr/>
-              <a:t>10</a:t>
+              <a:t>11</a:t>
             </a:fld>
             <a:endParaRPr kumimoji="1" lang="ja-JP" altLang="en-US"/>
           </a:p>
@@ -12549,7 +12807,7 @@
 </p:sld>
 </file>
 
-<file path=ppt/slides/slide11.xml><?xml version="1.0" encoding="utf-8"?>
+<file path=ppt/slides/slide12.xml><?xml version="1.0" encoding="utf-8"?>
 <p:sld xmlns:a="http://schemas.openxmlformats.org/drawingml/2006/main" xmlns:r="http://schemas.openxmlformats.org/officeDocument/2006/relationships" xmlns:p="http://schemas.openxmlformats.org/presentationml/2006/main">
   <p:cSld>
     <p:spTree>
@@ -13329,7 +13587,7 @@
             <a:fld id="{D28C7C6D-0F52-4FBA-8358-35C6083C2133}" type="slidenum">
               <a:rPr kumimoji="1" lang="ja-JP" altLang="en-US" smtClean="0"/>
               <a:pPr/>
-              <a:t>11</a:t>
+              <a:t>12</a:t>
             </a:fld>
             <a:endParaRPr kumimoji="1" lang="ja-JP" altLang="en-US"/>
           </a:p>
@@ -13377,7 +13635,7 @@
 </p:sld>
 </file>
 
-<file path=ppt/slides/slide12.xml><?xml version="1.0" encoding="utf-8"?>
+<file path=ppt/slides/slide13.xml><?xml version="1.0" encoding="utf-8"?>
 <p:sld xmlns:a="http://schemas.openxmlformats.org/drawingml/2006/main" xmlns:r="http://schemas.openxmlformats.org/officeDocument/2006/relationships" xmlns:p="http://schemas.openxmlformats.org/presentationml/2006/main">
   <p:cSld>
     <p:spTree>
@@ -13655,7 +13913,7 @@
             <a:fld id="{D28C7C6D-0F52-4FBA-8358-35C6083C2133}" type="slidenum">
               <a:rPr kumimoji="1" lang="ja-JP" altLang="en-US" smtClean="0"/>
               <a:pPr/>
-              <a:t>12</a:t>
+              <a:t>13</a:t>
             </a:fld>
             <a:endParaRPr kumimoji="1" lang="ja-JP" altLang="en-US"/>
           </a:p>
@@ -13703,7 +13961,7 @@
 </p:sld>
 </file>
 
-<file path=ppt/slides/slide13.xml><?xml version="1.0" encoding="utf-8"?>
+<file path=ppt/slides/slide14.xml><?xml version="1.0" encoding="utf-8"?>
 <p:sld xmlns:a="http://schemas.openxmlformats.org/drawingml/2006/main" xmlns:r="http://schemas.openxmlformats.org/officeDocument/2006/relationships" xmlns:p="http://schemas.openxmlformats.org/presentationml/2006/main">
   <p:cSld>
     <p:spTree>
@@ -14116,7 +14374,7 @@
             <a:fld id="{D28C7C6D-0F52-4FBA-8358-35C6083C2133}" type="slidenum">
               <a:rPr kumimoji="1" lang="ja-JP" altLang="en-US" smtClean="0"/>
               <a:pPr/>
-              <a:t>13</a:t>
+              <a:t>14</a:t>
             </a:fld>
             <a:endParaRPr kumimoji="1" lang="ja-JP" altLang="en-US"/>
           </a:p>
@@ -14155,277 +14413,6 @@
     <p:extLst>
       <p:ext uri="{BB962C8B-B14F-4D97-AF65-F5344CB8AC3E}">
         <p14:creationId xmlns:p14="http://schemas.microsoft.com/office/powerpoint/2010/main" val="1600006205"/>
-      </p:ext>
-    </p:extLst>
-  </p:cSld>
-  <p:clrMapOvr>
-    <a:masterClrMapping/>
-  </p:clrMapOvr>
-</p:sld>
-</file>
-
-<file path=ppt/slides/slide14.xml><?xml version="1.0" encoding="utf-8"?>
-<p:sld xmlns:a="http://schemas.openxmlformats.org/drawingml/2006/main" xmlns:r="http://schemas.openxmlformats.org/officeDocument/2006/relationships" xmlns:p="http://schemas.openxmlformats.org/presentationml/2006/main">
-  <p:cSld>
-    <p:spTree>
-      <p:nvGrpSpPr>
-        <p:cNvPr id="1" name=""/>
-        <p:cNvGrpSpPr/>
-        <p:nvPr/>
-      </p:nvGrpSpPr>
-      <p:grpSpPr>
-        <a:xfrm>
-          <a:off x="0" y="0"/>
-          <a:ext cx="0" cy="0"/>
-          <a:chOff x="0" y="0"/>
-          <a:chExt cx="0" cy="0"/>
-        </a:xfrm>
-      </p:grpSpPr>
-      <p:sp>
-        <p:nvSpPr>
-          <p:cNvPr id="9" name="タイトル 8"/>
-          <p:cNvSpPr>
-            <a:spLocks noGrp="1"/>
-          </p:cNvSpPr>
-          <p:nvPr>
-            <p:ph type="title"/>
-          </p:nvPr>
-        </p:nvSpPr>
-        <p:spPr/>
-        <p:txBody>
-          <a:bodyPr/>
-          <a:lstStyle/>
-          <a:p>
-            <a:r>
-              <a:rPr kumimoji="1" lang="ja" altLang="en-US" dirty="0"/>
-              <a:t>データアントレプレナー</a:t>
-            </a:r>
-            <a:r>
-              <a:rPr kumimoji="1" lang="ja-JP" altLang="en-US"/>
-              <a:t>実践論</a:t>
-            </a:r>
-            <a:r>
-              <a:rPr kumimoji="1" lang="en-US" altLang="ja-JP" dirty="0"/>
-              <a:t> | </a:t>
-            </a:r>
-            <a:r>
-              <a:rPr kumimoji="1" lang="ja" altLang="en-US" dirty="0"/>
-              <a:t>ピッチコンテスト</a:t>
-            </a:r>
-            <a:endParaRPr kumimoji="1" lang="ja-JP" altLang="en-US" dirty="0"/>
-          </a:p>
-        </p:txBody>
-      </p:sp>
-      <p:sp>
-        <p:nvSpPr>
-          <p:cNvPr id="15" name="テキスト プレースホルダー 9">
-            <a:extLst>
-              <a:ext uri="{FF2B5EF4-FFF2-40B4-BE49-F238E27FC236}">
-                <a16:creationId xmlns:a16="http://schemas.microsoft.com/office/drawing/2014/main" id="{98F5EB82-97F4-BE48-8A01-5935D01BB0CD}"/>
-              </a:ext>
-            </a:extLst>
-          </p:cNvPr>
-          <p:cNvSpPr>
-            <a:spLocks noGrp="1"/>
-          </p:cNvSpPr>
-          <p:nvPr>
-            <p:ph type="body" sz="quarter" idx="12"/>
-          </p:nvPr>
-        </p:nvSpPr>
-        <p:spPr>
-          <a:xfrm>
-            <a:off x="2452753" y="3202378"/>
-            <a:ext cx="12610784" cy="5818947"/>
-          </a:xfrm>
-        </p:spPr>
-        <p:txBody>
-          <a:bodyPr>
-            <a:normAutofit fontScale="92500" lnSpcReduction="20000"/>
-          </a:bodyPr>
-          <a:lstStyle/>
-          <a:p>
-            <a:r>
-              <a:rPr lang="ja-JP" altLang="en-US" sz="4000"/>
-              <a:t>デ</a:t>
-            </a:r>
-            <a:r>
-              <a:rPr lang="ja" altLang="en-US" sz="4000" dirty="0"/>
-              <a:t>ータから価値創造，事業創生を意識し，実例を学</a:t>
-            </a:r>
-            <a:r>
-              <a:rPr lang="ja-JP" altLang="en-US" sz="4000"/>
-              <a:t>び</a:t>
-            </a:r>
-            <a:r>
-              <a:rPr lang="ja" altLang="en-US" sz="4000" dirty="0"/>
-              <a:t>な</a:t>
-            </a:r>
-            <a:r>
-              <a:rPr lang="ja-JP" altLang="en-US" sz="4000"/>
-              <a:t>が</a:t>
-            </a:r>
-            <a:r>
-              <a:rPr lang="ja" altLang="en-US" sz="4000" dirty="0"/>
-              <a:t>ら自らの調査，視点に基</a:t>
-            </a:r>
-            <a:r>
-              <a:rPr lang="ja-JP" altLang="en-US" sz="4000"/>
-              <a:t>づ</a:t>
-            </a:r>
-            <a:r>
-              <a:rPr lang="ja" altLang="en-US" sz="4000" dirty="0"/>
-              <a:t>き</a:t>
-            </a:r>
-            <a:r>
-              <a:rPr lang="ja-JP" altLang="en-US" sz="4000"/>
-              <a:t>ビジ</a:t>
-            </a:r>
-            <a:r>
-              <a:rPr lang="ja" altLang="en-US" sz="4000" dirty="0"/>
-              <a:t>ネス</a:t>
-            </a:r>
-            <a:r>
-              <a:rPr lang="ja-JP" altLang="en-US" sz="4000"/>
-              <a:t>プ</a:t>
-            </a:r>
-            <a:r>
-              <a:rPr lang="ja" altLang="en-US" sz="4000" dirty="0"/>
-              <a:t>ランを提案する</a:t>
-            </a:r>
-            <a:endParaRPr lang="en-US" altLang="ja" sz="4000" dirty="0"/>
-          </a:p>
-          <a:p>
-            <a:r>
-              <a:rPr lang="ja-JP" altLang="en-US" sz="4000"/>
-              <a:t>評価項目</a:t>
-            </a:r>
-            <a:endParaRPr lang="en-US" altLang="ja-JP" sz="4000" dirty="0"/>
-          </a:p>
-          <a:p>
-            <a:pPr lvl="1"/>
-            <a:r>
-              <a:rPr lang="ja-JP" altLang="en-US" sz="4000"/>
-              <a:t>データから</a:t>
-            </a:r>
-            <a:r>
-              <a:rPr lang="ja" altLang="en-US" sz="4000" dirty="0"/>
-              <a:t>価値創造できているか</a:t>
-            </a:r>
-            <a:endParaRPr lang="en-US" altLang="ja-JP" sz="4000" dirty="0"/>
-          </a:p>
-          <a:p>
-            <a:pPr lvl="1"/>
-            <a:r>
-              <a:rPr lang="ja-JP" altLang="en-US" sz="4000"/>
-              <a:t>自らの調査や視点に</a:t>
-            </a:r>
-            <a:r>
-              <a:rPr lang="ja" altLang="en-US" sz="4000" dirty="0"/>
-              <a:t>基づいているか</a:t>
-            </a:r>
-            <a:endParaRPr lang="en-US" altLang="ja-JP" sz="4000" dirty="0"/>
-          </a:p>
-          <a:p>
-            <a:pPr lvl="1"/>
-            <a:r>
-              <a:rPr lang="ja-JP" altLang="en-US" sz="4000"/>
-              <a:t>新規性</a:t>
-            </a:r>
-            <a:endParaRPr lang="en-US" altLang="ja-JP" sz="4000" dirty="0"/>
-          </a:p>
-          <a:p>
-            <a:pPr lvl="1"/>
-            <a:r>
-              <a:rPr lang="ja" altLang="en-US" sz="4000" dirty="0"/>
-              <a:t>社会的インパクト</a:t>
-            </a:r>
-            <a:endParaRPr lang="en-US" altLang="ja-JP" sz="3200" dirty="0"/>
-          </a:p>
-          <a:p>
-            <a:r>
-              <a:rPr lang="en-US" altLang="ja-JP" sz="4000" dirty="0"/>
-              <a:t>3</a:t>
-            </a:r>
-            <a:r>
-              <a:rPr lang="ja-JP" altLang="en-US" sz="4000"/>
-              <a:t>分で各企業の方や講師陣にプレゼンを行う</a:t>
-            </a:r>
-            <a:endParaRPr lang="en-US" altLang="ja-JP" sz="4000" dirty="0"/>
-          </a:p>
-          <a:p>
-            <a:pPr marL="557146" lvl="1" indent="0">
-              <a:buNone/>
-            </a:pPr>
-            <a:endParaRPr lang="en-US" altLang="ja-JP" dirty="0"/>
-          </a:p>
-          <a:p>
-            <a:endParaRPr lang="en-US" altLang="ja-JP" sz="4000" dirty="0"/>
-          </a:p>
-        </p:txBody>
-      </p:sp>
-      <p:sp>
-        <p:nvSpPr>
-          <p:cNvPr id="6" name="Slide Number Placeholder 5">
-            <a:extLst>
-              <a:ext uri="{FF2B5EF4-FFF2-40B4-BE49-F238E27FC236}">
-                <a16:creationId xmlns:a16="http://schemas.microsoft.com/office/drawing/2014/main" id="{618FEC59-2BB6-0D4B-A609-16E7917EB08A}"/>
-              </a:ext>
-            </a:extLst>
-          </p:cNvPr>
-          <p:cNvSpPr>
-            <a:spLocks noGrp="1"/>
-          </p:cNvSpPr>
-          <p:nvPr>
-            <p:ph type="sldNum" sz="quarter" idx="10"/>
-          </p:nvPr>
-        </p:nvSpPr>
-        <p:spPr/>
-        <p:txBody>
-          <a:bodyPr/>
-          <a:lstStyle/>
-          <a:p>
-            <a:fld id="{D28C7C6D-0F52-4FBA-8358-35C6083C2133}" type="slidenum">
-              <a:rPr kumimoji="1" lang="ja-JP" altLang="en-US" smtClean="0"/>
-              <a:pPr/>
-              <a:t>14</a:t>
-            </a:fld>
-            <a:endParaRPr kumimoji="1" lang="ja-JP" altLang="en-US"/>
-          </a:p>
-        </p:txBody>
-      </p:sp>
-      <p:sp>
-        <p:nvSpPr>
-          <p:cNvPr id="7" name="Footer Placeholder 6">
-            <a:extLst>
-              <a:ext uri="{FF2B5EF4-FFF2-40B4-BE49-F238E27FC236}">
-                <a16:creationId xmlns:a16="http://schemas.microsoft.com/office/drawing/2014/main" id="{9A35ECC3-43D8-FD47-9B2A-7B4959CF0590}"/>
-              </a:ext>
-            </a:extLst>
-          </p:cNvPr>
-          <p:cNvSpPr>
-            <a:spLocks noGrp="1"/>
-          </p:cNvSpPr>
-          <p:nvPr>
-            <p:ph type="ftr" sz="quarter" idx="11"/>
-          </p:nvPr>
-        </p:nvSpPr>
-        <p:spPr/>
-        <p:txBody>
-          <a:bodyPr/>
-          <a:lstStyle/>
-          <a:p>
-            <a:r>
-              <a:rPr kumimoji="1" lang="en-US" altLang="ja-JP"/>
-              <a:t>@Takato Matsumoto, 2020</a:t>
-            </a:r>
-            <a:endParaRPr kumimoji="1" lang="ja-JP" altLang="en-US" dirty="0"/>
-          </a:p>
-        </p:txBody>
-      </p:sp>
-    </p:spTree>
-    <p:extLst>
-      <p:ext uri="{BB962C8B-B14F-4D97-AF65-F5344CB8AC3E}">
-        <p14:creationId xmlns:p14="http://schemas.microsoft.com/office/powerpoint/2010/main" val="1136649573"/>
       </p:ext>
     </p:extLst>
   </p:cSld>
@@ -14454,6 +14441,277 @@
       </p:grpSpPr>
       <p:sp>
         <p:nvSpPr>
+          <p:cNvPr id="9" name="タイトル 8"/>
+          <p:cNvSpPr>
+            <a:spLocks noGrp="1"/>
+          </p:cNvSpPr>
+          <p:nvPr>
+            <p:ph type="title"/>
+          </p:nvPr>
+        </p:nvSpPr>
+        <p:spPr/>
+        <p:txBody>
+          <a:bodyPr/>
+          <a:lstStyle/>
+          <a:p>
+            <a:r>
+              <a:rPr kumimoji="1" lang="ja" altLang="en-US" dirty="0"/>
+              <a:t>データアントレプレナー</a:t>
+            </a:r>
+            <a:r>
+              <a:rPr kumimoji="1" lang="ja-JP" altLang="en-US"/>
+              <a:t>実践論</a:t>
+            </a:r>
+            <a:r>
+              <a:rPr kumimoji="1" lang="en-US" altLang="ja-JP" dirty="0"/>
+              <a:t> | </a:t>
+            </a:r>
+            <a:r>
+              <a:rPr kumimoji="1" lang="ja" altLang="en-US" dirty="0"/>
+              <a:t>ピッチコンテスト</a:t>
+            </a:r>
+            <a:endParaRPr kumimoji="1" lang="ja-JP" altLang="en-US" dirty="0"/>
+          </a:p>
+        </p:txBody>
+      </p:sp>
+      <p:sp>
+        <p:nvSpPr>
+          <p:cNvPr id="15" name="テキスト プレースホルダー 9">
+            <a:extLst>
+              <a:ext uri="{FF2B5EF4-FFF2-40B4-BE49-F238E27FC236}">
+                <a16:creationId xmlns:a16="http://schemas.microsoft.com/office/drawing/2014/main" id="{98F5EB82-97F4-BE48-8A01-5935D01BB0CD}"/>
+              </a:ext>
+            </a:extLst>
+          </p:cNvPr>
+          <p:cNvSpPr>
+            <a:spLocks noGrp="1"/>
+          </p:cNvSpPr>
+          <p:nvPr>
+            <p:ph type="body" sz="quarter" idx="12"/>
+          </p:nvPr>
+        </p:nvSpPr>
+        <p:spPr>
+          <a:xfrm>
+            <a:off x="2452753" y="3202378"/>
+            <a:ext cx="12610784" cy="5818947"/>
+          </a:xfrm>
+        </p:spPr>
+        <p:txBody>
+          <a:bodyPr>
+            <a:normAutofit fontScale="92500" lnSpcReduction="20000"/>
+          </a:bodyPr>
+          <a:lstStyle/>
+          <a:p>
+            <a:r>
+              <a:rPr lang="ja-JP" altLang="en-US" sz="4000"/>
+              <a:t>デ</a:t>
+            </a:r>
+            <a:r>
+              <a:rPr lang="ja" altLang="en-US" sz="4000" dirty="0"/>
+              <a:t>ータから価値創造，事業創生を意識し，実例を学</a:t>
+            </a:r>
+            <a:r>
+              <a:rPr lang="ja-JP" altLang="en-US" sz="4000"/>
+              <a:t>び</a:t>
+            </a:r>
+            <a:r>
+              <a:rPr lang="ja" altLang="en-US" sz="4000" dirty="0"/>
+              <a:t>な</a:t>
+            </a:r>
+            <a:r>
+              <a:rPr lang="ja-JP" altLang="en-US" sz="4000"/>
+              <a:t>が</a:t>
+            </a:r>
+            <a:r>
+              <a:rPr lang="ja" altLang="en-US" sz="4000" dirty="0"/>
+              <a:t>ら自らの調査，視点に基</a:t>
+            </a:r>
+            <a:r>
+              <a:rPr lang="ja-JP" altLang="en-US" sz="4000"/>
+              <a:t>づ</a:t>
+            </a:r>
+            <a:r>
+              <a:rPr lang="ja" altLang="en-US" sz="4000" dirty="0"/>
+              <a:t>き</a:t>
+            </a:r>
+            <a:r>
+              <a:rPr lang="ja-JP" altLang="en-US" sz="4000"/>
+              <a:t>ビジ</a:t>
+            </a:r>
+            <a:r>
+              <a:rPr lang="ja" altLang="en-US" sz="4000" dirty="0"/>
+              <a:t>ネス</a:t>
+            </a:r>
+            <a:r>
+              <a:rPr lang="ja-JP" altLang="en-US" sz="4000"/>
+              <a:t>プ</a:t>
+            </a:r>
+            <a:r>
+              <a:rPr lang="ja" altLang="en-US" sz="4000" dirty="0"/>
+              <a:t>ランを提案する</a:t>
+            </a:r>
+            <a:endParaRPr lang="en-US" altLang="ja" sz="4000" dirty="0"/>
+          </a:p>
+          <a:p>
+            <a:r>
+              <a:rPr lang="ja-JP" altLang="en-US" sz="4000"/>
+              <a:t>評価項目</a:t>
+            </a:r>
+            <a:endParaRPr lang="en-US" altLang="ja-JP" sz="4000" dirty="0"/>
+          </a:p>
+          <a:p>
+            <a:pPr lvl="1"/>
+            <a:r>
+              <a:rPr lang="ja-JP" altLang="en-US" sz="4000"/>
+              <a:t>データから</a:t>
+            </a:r>
+            <a:r>
+              <a:rPr lang="ja" altLang="en-US" sz="4000" dirty="0"/>
+              <a:t>価値創造できているか</a:t>
+            </a:r>
+            <a:endParaRPr lang="en-US" altLang="ja-JP" sz="4000" dirty="0"/>
+          </a:p>
+          <a:p>
+            <a:pPr lvl="1"/>
+            <a:r>
+              <a:rPr lang="ja-JP" altLang="en-US" sz="4000"/>
+              <a:t>自らの調査や視点に</a:t>
+            </a:r>
+            <a:r>
+              <a:rPr lang="ja" altLang="en-US" sz="4000" dirty="0"/>
+              <a:t>基づいているか</a:t>
+            </a:r>
+            <a:endParaRPr lang="en-US" altLang="ja-JP" sz="4000" dirty="0"/>
+          </a:p>
+          <a:p>
+            <a:pPr lvl="1"/>
+            <a:r>
+              <a:rPr lang="ja-JP" altLang="en-US" sz="4000"/>
+              <a:t>新規性</a:t>
+            </a:r>
+            <a:endParaRPr lang="en-US" altLang="ja-JP" sz="4000" dirty="0"/>
+          </a:p>
+          <a:p>
+            <a:pPr lvl="1"/>
+            <a:r>
+              <a:rPr lang="ja" altLang="en-US" sz="4000" dirty="0"/>
+              <a:t>社会的インパクト</a:t>
+            </a:r>
+            <a:endParaRPr lang="en-US" altLang="ja-JP" sz="3200" dirty="0"/>
+          </a:p>
+          <a:p>
+            <a:r>
+              <a:rPr lang="en-US" altLang="ja-JP" sz="4000" dirty="0"/>
+              <a:t>3</a:t>
+            </a:r>
+            <a:r>
+              <a:rPr lang="ja-JP" altLang="en-US" sz="4000"/>
+              <a:t>分で各企業の方や講師陣にプレゼンを行う</a:t>
+            </a:r>
+            <a:endParaRPr lang="en-US" altLang="ja-JP" sz="4000" dirty="0"/>
+          </a:p>
+          <a:p>
+            <a:pPr marL="557146" lvl="1" indent="0">
+              <a:buNone/>
+            </a:pPr>
+            <a:endParaRPr lang="en-US" altLang="ja-JP" dirty="0"/>
+          </a:p>
+          <a:p>
+            <a:endParaRPr lang="en-US" altLang="ja-JP" sz="4000" dirty="0"/>
+          </a:p>
+        </p:txBody>
+      </p:sp>
+      <p:sp>
+        <p:nvSpPr>
+          <p:cNvPr id="6" name="Slide Number Placeholder 5">
+            <a:extLst>
+              <a:ext uri="{FF2B5EF4-FFF2-40B4-BE49-F238E27FC236}">
+                <a16:creationId xmlns:a16="http://schemas.microsoft.com/office/drawing/2014/main" id="{618FEC59-2BB6-0D4B-A609-16E7917EB08A}"/>
+              </a:ext>
+            </a:extLst>
+          </p:cNvPr>
+          <p:cNvSpPr>
+            <a:spLocks noGrp="1"/>
+          </p:cNvSpPr>
+          <p:nvPr>
+            <p:ph type="sldNum" sz="quarter" idx="10"/>
+          </p:nvPr>
+        </p:nvSpPr>
+        <p:spPr/>
+        <p:txBody>
+          <a:bodyPr/>
+          <a:lstStyle/>
+          <a:p>
+            <a:fld id="{D28C7C6D-0F52-4FBA-8358-35C6083C2133}" type="slidenum">
+              <a:rPr kumimoji="1" lang="ja-JP" altLang="en-US" smtClean="0"/>
+              <a:pPr/>
+              <a:t>15</a:t>
+            </a:fld>
+            <a:endParaRPr kumimoji="1" lang="ja-JP" altLang="en-US"/>
+          </a:p>
+        </p:txBody>
+      </p:sp>
+      <p:sp>
+        <p:nvSpPr>
+          <p:cNvPr id="7" name="Footer Placeholder 6">
+            <a:extLst>
+              <a:ext uri="{FF2B5EF4-FFF2-40B4-BE49-F238E27FC236}">
+                <a16:creationId xmlns:a16="http://schemas.microsoft.com/office/drawing/2014/main" id="{9A35ECC3-43D8-FD47-9B2A-7B4959CF0590}"/>
+              </a:ext>
+            </a:extLst>
+          </p:cNvPr>
+          <p:cNvSpPr>
+            <a:spLocks noGrp="1"/>
+          </p:cNvSpPr>
+          <p:nvPr>
+            <p:ph type="ftr" sz="quarter" idx="11"/>
+          </p:nvPr>
+        </p:nvSpPr>
+        <p:spPr/>
+        <p:txBody>
+          <a:bodyPr/>
+          <a:lstStyle/>
+          <a:p>
+            <a:r>
+              <a:rPr kumimoji="1" lang="en-US" altLang="ja-JP"/>
+              <a:t>@Takato Matsumoto, 2020</a:t>
+            </a:r>
+            <a:endParaRPr kumimoji="1" lang="ja-JP" altLang="en-US" dirty="0"/>
+          </a:p>
+        </p:txBody>
+      </p:sp>
+    </p:spTree>
+    <p:extLst>
+      <p:ext uri="{BB962C8B-B14F-4D97-AF65-F5344CB8AC3E}">
+        <p14:creationId xmlns:p14="http://schemas.microsoft.com/office/powerpoint/2010/main" val="1136649573"/>
+      </p:ext>
+    </p:extLst>
+  </p:cSld>
+  <p:clrMapOvr>
+    <a:masterClrMapping/>
+  </p:clrMapOvr>
+</p:sld>
+</file>
+
+<file path=ppt/slides/slide16.xml><?xml version="1.0" encoding="utf-8"?>
+<p:sld xmlns:a="http://schemas.openxmlformats.org/drawingml/2006/main" xmlns:r="http://schemas.openxmlformats.org/officeDocument/2006/relationships" xmlns:p="http://schemas.openxmlformats.org/presentationml/2006/main">
+  <p:cSld>
+    <p:spTree>
+      <p:nvGrpSpPr>
+        <p:cNvPr id="1" name=""/>
+        <p:cNvGrpSpPr/>
+        <p:nvPr/>
+      </p:nvGrpSpPr>
+      <p:grpSpPr>
+        <a:xfrm>
+          <a:off x="0" y="0"/>
+          <a:ext cx="0" cy="0"/>
+          <a:chOff x="0" y="0"/>
+          <a:chExt cx="0" cy="0"/>
+        </a:xfrm>
+      </p:grpSpPr>
+      <p:sp>
+        <p:nvSpPr>
           <p:cNvPr id="6" name="タイトル 5"/>
           <p:cNvSpPr>
             <a:spLocks noGrp="1"/>
@@ -14552,7 +14810,7 @@
 </p:sld>
 </file>
 
-<file path=ppt/slides/slide16.xml><?xml version="1.0" encoding="utf-8"?>
+<file path=ppt/slides/slide17.xml><?xml version="1.0" encoding="utf-8"?>
 <p:sld xmlns:a="http://schemas.openxmlformats.org/drawingml/2006/main" xmlns:r="http://schemas.openxmlformats.org/officeDocument/2006/relationships" xmlns:p="http://schemas.openxmlformats.org/presentationml/2006/main">
   <p:cSld>
     <p:spTree>
@@ -15026,7 +15284,7 @@
             <a:fld id="{D28C7C6D-0F52-4FBA-8358-35C6083C2133}" type="slidenum">
               <a:rPr kumimoji="1" lang="ja-JP" altLang="en-US" smtClean="0"/>
               <a:pPr/>
-              <a:t>16</a:t>
+              <a:t>17</a:t>
             </a:fld>
             <a:endParaRPr kumimoji="1" lang="ja-JP" altLang="en-US"/>
           </a:p>
@@ -15074,7 +15332,7 @@
 </p:sld>
 </file>
 
-<file path=ppt/slides/slide17.xml><?xml version="1.0" encoding="utf-8"?>
+<file path=ppt/slides/slide18.xml><?xml version="1.0" encoding="utf-8"?>
 <p:sld xmlns:a="http://schemas.openxmlformats.org/drawingml/2006/main" xmlns:r="http://schemas.openxmlformats.org/officeDocument/2006/relationships" xmlns:p="http://schemas.openxmlformats.org/presentationml/2006/main">
   <p:cSld>
     <p:spTree>
@@ -15617,7 +15875,7 @@
             <a:fld id="{D28C7C6D-0F52-4FBA-8358-35C6083C2133}" type="slidenum">
               <a:rPr kumimoji="1" lang="ja-JP" altLang="en-US" smtClean="0"/>
               <a:pPr/>
-              <a:t>17</a:t>
+              <a:t>18</a:t>
             </a:fld>
             <a:endParaRPr kumimoji="1" lang="ja-JP" altLang="en-US"/>
           </a:p>
@@ -15665,7 +15923,7 @@
 </p:sld>
 </file>
 
-<file path=ppt/slides/slide18.xml><?xml version="1.0" encoding="utf-8"?>
+<file path=ppt/slides/slide19.xml><?xml version="1.0" encoding="utf-8"?>
 <p:sld xmlns:a="http://schemas.openxmlformats.org/drawingml/2006/main" xmlns:r="http://schemas.openxmlformats.org/officeDocument/2006/relationships" xmlns:p="http://schemas.openxmlformats.org/presentationml/2006/main">
   <p:cSld>
     <p:spTree>
@@ -16357,7 +16615,7 @@
             <a:fld id="{D28C7C6D-0F52-4FBA-8358-35C6083C2133}" type="slidenum">
               <a:rPr kumimoji="1" lang="ja-JP" altLang="en-US" smtClean="0"/>
               <a:pPr/>
-              <a:t>18</a:t>
+              <a:t>19</a:t>
             </a:fld>
             <a:endParaRPr kumimoji="1" lang="ja-JP" altLang="en-US"/>
           </a:p>
@@ -16396,205 +16654,6 @@
     <p:extLst>
       <p:ext uri="{BB962C8B-B14F-4D97-AF65-F5344CB8AC3E}">
         <p14:creationId xmlns:p14="http://schemas.microsoft.com/office/powerpoint/2010/main" val="145016960"/>
-      </p:ext>
-    </p:extLst>
-  </p:cSld>
-  <p:clrMapOvr>
-    <a:masterClrMapping/>
-  </p:clrMapOvr>
-</p:sld>
-</file>
-
-<file path=ppt/slides/slide19.xml><?xml version="1.0" encoding="utf-8"?>
-<p:sld xmlns:a="http://schemas.openxmlformats.org/drawingml/2006/main" xmlns:r="http://schemas.openxmlformats.org/officeDocument/2006/relationships" xmlns:p="http://schemas.openxmlformats.org/presentationml/2006/main">
-  <p:cSld>
-    <p:spTree>
-      <p:nvGrpSpPr>
-        <p:cNvPr id="1" name=""/>
-        <p:cNvGrpSpPr/>
-        <p:nvPr/>
-      </p:nvGrpSpPr>
-      <p:grpSpPr>
-        <a:xfrm>
-          <a:off x="0" y="0"/>
-          <a:ext cx="0" cy="0"/>
-          <a:chOff x="0" y="0"/>
-          <a:chExt cx="0" cy="0"/>
-        </a:xfrm>
-      </p:grpSpPr>
-      <p:sp>
-        <p:nvSpPr>
-          <p:cNvPr id="5" name="タイトル 4"/>
-          <p:cNvSpPr>
-            <a:spLocks noGrp="1"/>
-          </p:cNvSpPr>
-          <p:nvPr>
-            <p:ph type="title"/>
-          </p:nvPr>
-        </p:nvSpPr>
-        <p:spPr/>
-        <p:txBody>
-          <a:bodyPr>
-            <a:normAutofit/>
-          </a:bodyPr>
-          <a:lstStyle/>
-          <a:p>
-            <a:r>
-              <a:rPr kumimoji="1" lang="ja-JP" altLang="en-US" sz="6600" dirty="0"/>
-              <a:t>コンテンツ</a:t>
-            </a:r>
-          </a:p>
-        </p:txBody>
-      </p:sp>
-      <p:sp>
-        <p:nvSpPr>
-          <p:cNvPr id="6" name="テキスト プレースホルダー 5"/>
-          <p:cNvSpPr>
-            <a:spLocks noGrp="1"/>
-          </p:cNvSpPr>
-          <p:nvPr>
-            <p:ph type="body" sz="quarter" idx="12"/>
-          </p:nvPr>
-        </p:nvSpPr>
-        <p:spPr>
-          <a:xfrm>
-            <a:off x="7709647" y="1783556"/>
-            <a:ext cx="10578353" cy="6718300"/>
-          </a:xfrm>
-        </p:spPr>
-        <p:txBody>
-          <a:bodyPr>
-            <a:normAutofit/>
-          </a:bodyPr>
-          <a:lstStyle/>
-          <a:p>
-            <a:r>
-              <a:rPr lang="ja" altLang="en-US" sz="4200" dirty="0"/>
-              <a:t>自己紹介</a:t>
-            </a:r>
-            <a:endParaRPr lang="en-US" altLang="ja" sz="4200" dirty="0"/>
-          </a:p>
-          <a:p>
-            <a:r>
-              <a:rPr lang="ja-JP" altLang="en-US" sz="4200"/>
-              <a:t>データ</a:t>
-            </a:r>
-            <a:r>
-              <a:rPr lang="ja" altLang="en-US" sz="4200" dirty="0"/>
-              <a:t>アントレプレナーフェロープログラム</a:t>
-            </a:r>
-            <a:endParaRPr lang="en-US" altLang="ja-JP" sz="4200" dirty="0"/>
-          </a:p>
-          <a:p>
-            <a:r>
-              <a:rPr kumimoji="1" lang="ja" altLang="en-US" sz="4200" dirty="0"/>
-              <a:t>データアントレプレナー</a:t>
-            </a:r>
-            <a:r>
-              <a:rPr kumimoji="1" lang="ja-JP" altLang="en-US" sz="4200"/>
-              <a:t>実践論</a:t>
-            </a:r>
-            <a:endParaRPr kumimoji="1" lang="en-US" altLang="ja-JP" sz="4200" dirty="0"/>
-          </a:p>
-          <a:p>
-            <a:r>
-              <a:rPr kumimoji="1" lang="ja" altLang="en-US" sz="4200" dirty="0">
-                <a:solidFill>
-                  <a:schemeClr val="accent1"/>
-                </a:solidFill>
-              </a:rPr>
-              <a:t>データサイエンティスト</a:t>
-            </a:r>
-            <a:r>
-              <a:rPr kumimoji="1" lang="ja-JP" altLang="en-US" sz="4200">
-                <a:solidFill>
-                  <a:schemeClr val="accent1"/>
-                </a:solidFill>
-              </a:rPr>
-              <a:t>特論</a:t>
-            </a:r>
-            <a:endParaRPr kumimoji="1" lang="en-US" altLang="ja-JP" sz="4200" dirty="0">
-              <a:solidFill>
-                <a:schemeClr val="accent1"/>
-              </a:solidFill>
-            </a:endParaRPr>
-          </a:p>
-          <a:p>
-            <a:r>
-              <a:rPr lang="ja-JP" altLang="en-US" sz="4400"/>
-              <a:t>データ分析の目的、必要性</a:t>
-            </a:r>
-            <a:endParaRPr kumimoji="1" lang="en-US" altLang="ja-JP" sz="4200" dirty="0">
-              <a:solidFill>
-                <a:schemeClr val="accent1"/>
-              </a:solidFill>
-            </a:endParaRPr>
-          </a:p>
-        </p:txBody>
-      </p:sp>
-      <p:sp>
-        <p:nvSpPr>
-          <p:cNvPr id="4" name="Slide Number Placeholder 3">
-            <a:extLst>
-              <a:ext uri="{FF2B5EF4-FFF2-40B4-BE49-F238E27FC236}">
-                <a16:creationId xmlns:a16="http://schemas.microsoft.com/office/drawing/2014/main" id="{E857C27F-31E3-FD4B-B90C-CF6CDEEDFC7A}"/>
-              </a:ext>
-            </a:extLst>
-          </p:cNvPr>
-          <p:cNvSpPr>
-            <a:spLocks noGrp="1"/>
-          </p:cNvSpPr>
-          <p:nvPr>
-            <p:ph type="sldNum" sz="quarter" idx="10"/>
-          </p:nvPr>
-        </p:nvSpPr>
-        <p:spPr/>
-        <p:txBody>
-          <a:bodyPr/>
-          <a:lstStyle/>
-          <a:p>
-            <a:fld id="{D28C7C6D-0F52-4FBA-8358-35C6083C2133}" type="slidenum">
-              <a:rPr kumimoji="1" lang="ja-JP" altLang="en-US" smtClean="0"/>
-              <a:pPr/>
-              <a:t>19</a:t>
-            </a:fld>
-            <a:endParaRPr kumimoji="1" lang="ja-JP" altLang="en-US"/>
-          </a:p>
-        </p:txBody>
-      </p:sp>
-      <p:sp>
-        <p:nvSpPr>
-          <p:cNvPr id="7" name="Footer Placeholder 6">
-            <a:extLst>
-              <a:ext uri="{FF2B5EF4-FFF2-40B4-BE49-F238E27FC236}">
-                <a16:creationId xmlns:a16="http://schemas.microsoft.com/office/drawing/2014/main" id="{AE558B7F-26E7-DD4F-84D7-E1D64CC93010}"/>
-              </a:ext>
-            </a:extLst>
-          </p:cNvPr>
-          <p:cNvSpPr>
-            <a:spLocks noGrp="1"/>
-          </p:cNvSpPr>
-          <p:nvPr>
-            <p:ph type="ftr" sz="quarter" idx="11"/>
-          </p:nvPr>
-        </p:nvSpPr>
-        <p:spPr/>
-        <p:txBody>
-          <a:bodyPr/>
-          <a:lstStyle/>
-          <a:p>
-            <a:r>
-              <a:rPr kumimoji="1" lang="en-US" altLang="ja-JP"/>
-              <a:t>@Takato Matsumoto, 2020</a:t>
-            </a:r>
-            <a:endParaRPr kumimoji="1" lang="ja-JP" altLang="en-US" dirty="0"/>
-          </a:p>
-        </p:txBody>
-      </p:sp>
-    </p:spTree>
-    <p:extLst>
-      <p:ext uri="{BB962C8B-B14F-4D97-AF65-F5344CB8AC3E}">
-        <p14:creationId xmlns:p14="http://schemas.microsoft.com/office/powerpoint/2010/main" val="1249649557"/>
       </p:ext>
     </p:extLst>
   </p:cSld>
@@ -16642,8 +16701,8 @@
           <a:lstStyle/>
           <a:p>
             <a:r>
-              <a:rPr lang="ja-JP" altLang="en-US"/>
-              <a:t>質問について</a:t>
+              <a:rPr kumimoji="1" lang="ja-JP" altLang="en-US"/>
+              <a:t>講義資料動画</a:t>
             </a:r>
             <a:endParaRPr kumimoji="1" lang="ja-JP" altLang="en-US" dirty="0"/>
           </a:p>
@@ -16661,8 +16720,8 @@
         </p:nvSpPr>
         <p:spPr>
           <a:xfrm>
-            <a:off x="6396786" y="1967320"/>
-            <a:ext cx="11923868" cy="8072438"/>
+            <a:off x="1947164" y="2097087"/>
+            <a:ext cx="15252238" cy="8072438"/>
           </a:xfrm>
         </p:spPr>
         <p:txBody>
@@ -16672,62 +16731,87 @@
           <a:lstStyle/>
           <a:p>
             <a:r>
-              <a:rPr lang="en-US" altLang="ja-JP" sz="5400" dirty="0" err="1"/>
-              <a:t>sil.do</a:t>
+              <a:rPr lang="en-US" sz="5400" dirty="0"/>
+              <a:t>6/16</a:t>
             </a:r>
             <a:r>
               <a:rPr lang="ja-JP" altLang="en-US" sz="5400"/>
-              <a:t>で</a:t>
-            </a:r>
-            <a:r>
-              <a:rPr lang="ja" altLang="en-US" sz="5400" dirty="0"/>
-              <a:t>受け付けます</a:t>
-            </a:r>
-            <a:r>
-              <a:rPr lang="en-US" sz="5400" dirty="0">
+              <a:t>の講義内容</a:t>
+            </a:r>
+            <a:endParaRPr lang="en-US" sz="4600" dirty="0"/>
+          </a:p>
+          <a:p>
+            <a:pPr lvl="1"/>
+            <a:r>
+              <a:rPr lang="en-US" sz="4600" dirty="0"/>
+              <a:t> part1: </a:t>
+            </a:r>
+            <a:r>
+              <a:rPr lang="en-US" sz="4600" dirty="0">
                 <a:hlinkClick r:id="rId2"/>
               </a:rPr>
-              <a:t>https://www.sli.do/</a:t>
+              <a:t>https://youtu.be/Q5K5GwlkOo8</a:t>
+            </a:r>
+            <a:endParaRPr lang="en-US" sz="4600" dirty="0"/>
+          </a:p>
+          <a:p>
+            <a:pPr lvl="1"/>
+            <a:r>
+              <a:rPr lang="en-US" sz="4600" dirty="0"/>
+              <a:t> part2: </a:t>
+            </a:r>
+            <a:r>
+              <a:rPr lang="en-US" sz="4600" dirty="0">
+                <a:hlinkClick r:id="rId3"/>
+              </a:rPr>
+              <a:t>https://youtu.be/VGT8OSJ3CwI</a:t>
+            </a:r>
+            <a:endParaRPr lang="en-US" sz="4600" dirty="0"/>
+          </a:p>
+          <a:p>
+            <a:r>
+              <a:rPr lang="en-US" sz="5400" dirty="0"/>
+              <a:t>6/23</a:t>
+            </a:r>
+            <a:r>
+              <a:rPr lang="ja-JP" altLang="en-US" sz="5400"/>
+              <a:t>の講義内容</a:t>
             </a:r>
             <a:endParaRPr lang="en-US" sz="5400" dirty="0"/>
           </a:p>
           <a:p>
-            <a:r>
-              <a:rPr lang="en-US" altLang="zh-TW" sz="5400" dirty="0"/>
-              <a:t>Event code</a:t>
-            </a:r>
-            <a:br>
-              <a:rPr lang="en-US" altLang="zh-TW" sz="5400" dirty="0"/>
-            </a:br>
-            <a:r>
-              <a:rPr lang="en-US" altLang="ja" sz="5400" dirty="0">
-                <a:solidFill>
-                  <a:schemeClr val="accent2"/>
-                </a:solidFill>
+            <a:pPr lvl="1"/>
+            <a:r>
+              <a:rPr lang="en-US" sz="4600" dirty="0"/>
+              <a:t> part1: </a:t>
+            </a:r>
+            <a:r>
+              <a:rPr lang="en-US" sz="4600" dirty="0">
+                <a:hlinkClick r:id="rId4"/>
               </a:rPr>
-              <a:t># SA202</a:t>
-            </a:r>
-            <a:endParaRPr lang="en-US" altLang="ja-JP" sz="5400" dirty="0"/>
-          </a:p>
-          <a:p>
-            <a:r>
-              <a:rPr lang="ja-JP" altLang="en-US" sz="5400"/>
-              <a:t>ミーティングツールで質問が可能で</a:t>
-            </a:r>
-            <a:br>
-              <a:rPr lang="en-US" altLang="ja-JP" sz="5400" dirty="0"/>
-            </a:br>
-            <a:r>
-              <a:rPr lang="ja-JP" altLang="en-US" sz="5400"/>
-              <a:t>あればそちらでも大丈夫です</a:t>
-            </a:r>
-            <a:endParaRPr lang="en-US" altLang="ja-JP" sz="5400" dirty="0"/>
+              <a:t>https://youtu.be/FFsk6gESlO0</a:t>
+            </a:r>
+            <a:endParaRPr lang="en-US" sz="4600" dirty="0"/>
+          </a:p>
+          <a:p>
+            <a:pPr lvl="1"/>
+            <a:r>
+              <a:rPr lang="en-US" sz="4600" dirty="0"/>
+              <a:t> part2: </a:t>
+            </a:r>
+            <a:r>
+              <a:rPr lang="en-US" sz="4600" dirty="0">
+                <a:hlinkClick r:id="rId5"/>
+              </a:rPr>
+              <a:t>https://youtu.be/4B_y5rEgfeE</a:t>
+            </a:r>
+            <a:endParaRPr lang="en-US" sz="4600" dirty="0"/>
           </a:p>
           <a:p>
             <a:pPr marL="557146" lvl="1" indent="0">
               <a:buNone/>
             </a:pPr>
-            <a:endParaRPr lang="en-US" altLang="ja" sz="5400" dirty="0">
+            <a:endParaRPr lang="en-US" altLang="ja" sz="6000" dirty="0">
               <a:solidFill>
                 <a:schemeClr val="accent2"/>
               </a:solidFill>
@@ -16735,42 +16819,6 @@
           </a:p>
         </p:txBody>
       </p:sp>
-      <p:pic>
-        <p:nvPicPr>
-          <p:cNvPr id="28" name="Picture 27">
-            <a:extLst>
-              <a:ext uri="{FF2B5EF4-FFF2-40B4-BE49-F238E27FC236}">
-                <a16:creationId xmlns:a16="http://schemas.microsoft.com/office/drawing/2014/main" id="{F4CEDB55-ADAA-614C-80CF-4FA821C24C85}"/>
-              </a:ext>
-            </a:extLst>
-          </p:cNvPr>
-          <p:cNvPicPr>
-            <a:picLocks noChangeAspect="1"/>
-          </p:cNvPicPr>
-          <p:nvPr/>
-        </p:nvPicPr>
-        <p:blipFill>
-          <a:blip r:embed="rId3">
-            <a:extLst>
-              <a:ext uri="{28A0092B-C50C-407E-A947-70E740481C1C}">
-                <a14:useLocalDpi xmlns:a14="http://schemas.microsoft.com/office/drawing/2010/main" val="0"/>
-              </a:ext>
-            </a:extLst>
-          </a:blip>
-          <a:stretch>
-            <a:fillRect/>
-          </a:stretch>
-        </p:blipFill>
-        <p:spPr>
-          <a:xfrm>
-            <a:off x="0" y="2143436"/>
-            <a:ext cx="6511884" cy="6511884"/>
-          </a:xfrm>
-          <a:prstGeom prst="rect">
-            <a:avLst/>
-          </a:prstGeom>
-        </p:spPr>
-      </p:pic>
       <p:sp>
         <p:nvSpPr>
           <p:cNvPr id="31" name="Slide Number Placeholder 30">
@@ -16862,7 +16910,7 @@
       </p:grpSpPr>
       <p:sp>
         <p:nvSpPr>
-          <p:cNvPr id="9" name="タイトル 8"/>
+          <p:cNvPr id="5" name="タイトル 4"/>
           <p:cNvSpPr>
             <a:spLocks noGrp="1"/>
           </p:cNvSpPr>
@@ -16878,22 +16926,15 @@
           <a:lstStyle/>
           <a:p>
             <a:r>
-              <a:rPr kumimoji="1" lang="ja-JP" altLang="en-US"/>
-              <a:t>データサイエンティスト特論</a:t>
-            </a:r>
-            <a:endParaRPr kumimoji="1" lang="ja-JP" altLang="en-US" dirty="0"/>
-          </a:p>
-        </p:txBody>
-      </p:sp>
-      <p:sp>
-        <p:nvSpPr>
-          <p:cNvPr id="15" name="テキスト プレースホルダー 9">
-            <a:extLst>
-              <a:ext uri="{FF2B5EF4-FFF2-40B4-BE49-F238E27FC236}">
-                <a16:creationId xmlns:a16="http://schemas.microsoft.com/office/drawing/2014/main" id="{98F5EB82-97F4-BE48-8A01-5935D01BB0CD}"/>
-              </a:ext>
-            </a:extLst>
-          </p:cNvPr>
+              <a:rPr kumimoji="1" lang="ja-JP" altLang="en-US" sz="6600" dirty="0"/>
+              <a:t>コンテンツ</a:t>
+            </a:r>
+          </a:p>
+        </p:txBody>
+      </p:sp>
+      <p:sp>
+        <p:nvSpPr>
+          <p:cNvPr id="6" name="テキスト プレースホルダー 5"/>
           <p:cNvSpPr>
             <a:spLocks noGrp="1"/>
           </p:cNvSpPr>
@@ -16903,8 +16944,8 @@
         </p:nvSpPr>
         <p:spPr>
           <a:xfrm>
-            <a:off x="1596035" y="3725602"/>
-            <a:ext cx="16534150" cy="6698755"/>
+            <a:off x="7709647" y="1783556"/>
+            <a:ext cx="10578353" cy="6718300"/>
           </a:xfrm>
         </p:spPr>
         <p:txBody>
@@ -16914,122 +16955,75 @@
           <a:lstStyle/>
           <a:p>
             <a:r>
-              <a:rPr lang="ja-JP" altLang="en-US" sz="4000"/>
-              <a:t>実際の</a:t>
-            </a:r>
-            <a:r>
-              <a:rPr lang="ja" altLang="en-US" sz="4000" dirty="0"/>
-              <a:t>不動産データを</a:t>
-            </a:r>
-            <a:r>
-              <a:rPr lang="ja-JP" altLang="en-US" sz="4000"/>
-              <a:t>分析する</a:t>
-            </a:r>
-            <a:endParaRPr lang="en-US" altLang="ja-JP" sz="4000" dirty="0"/>
-          </a:p>
-          <a:p>
-            <a:pPr lvl="1"/>
-            <a:r>
-              <a:rPr lang="ja-JP" altLang="en-US" sz="3200"/>
-              <a:t>アメリカ，ワシントン</a:t>
-            </a:r>
-            <a:r>
-              <a:rPr lang="en-US" altLang="ja-JP" sz="3200" dirty="0"/>
-              <a:t>DC</a:t>
-            </a:r>
-            <a:r>
-              <a:rPr lang="ja-JP" altLang="en-US" sz="3200"/>
-              <a:t>の実データを分析した</a:t>
-            </a:r>
-            <a:endParaRPr lang="en-US" altLang="ja-JP" sz="3200" dirty="0"/>
-          </a:p>
-          <a:p>
-            <a:pPr lvl="1"/>
-            <a:r>
-              <a:rPr lang="ja-JP" altLang="en-US" sz="3200"/>
-              <a:t>データを分析して，データの特徴や，不動産の知識をつかむ</a:t>
-            </a:r>
-            <a:endParaRPr lang="en-US" altLang="ja-JP" sz="3200" dirty="0"/>
-          </a:p>
-          <a:p>
-            <a:r>
-              <a:rPr lang="ja-JP" altLang="en-US" sz="4000"/>
-              <a:t>物件価格の予測をする</a:t>
-            </a:r>
-            <a:endParaRPr lang="en-US" altLang="ja-JP" sz="4000" dirty="0"/>
-          </a:p>
-          <a:p>
-            <a:pPr lvl="1"/>
-            <a:r>
-              <a:rPr lang="ja" altLang="en-US" sz="3200" dirty="0"/>
-              <a:t>機械学習モデル</a:t>
-            </a:r>
-            <a:r>
-              <a:rPr lang="ja-JP" altLang="en-US" sz="3200"/>
-              <a:t>を用いて，精度の高い</a:t>
-            </a:r>
-            <a:r>
-              <a:rPr lang="ja" altLang="en-US" sz="3200" dirty="0"/>
-              <a:t>予測モデルを</a:t>
-            </a:r>
-            <a:r>
-              <a:rPr lang="ja-JP" altLang="en-US" sz="3200"/>
-              <a:t>作ることが</a:t>
-            </a:r>
-            <a:r>
-              <a:rPr lang="ja" altLang="en-US" sz="3200" dirty="0"/>
-              <a:t>コンペティション</a:t>
-            </a:r>
-            <a:r>
-              <a:rPr lang="ja-JP" altLang="en-US" sz="3200"/>
-              <a:t>の目標</a:t>
-            </a:r>
-            <a:endParaRPr lang="en-US" altLang="ja-JP" sz="3200" dirty="0"/>
-          </a:p>
-          <a:p>
-            <a:pPr lvl="1"/>
-            <a:r>
-              <a:rPr lang="ja-JP" altLang="en-US" sz="3200"/>
-              <a:t>４０人クラス</a:t>
-            </a:r>
-            <a:r>
-              <a:rPr lang="en-US" altLang="ja-JP" sz="3200" dirty="0"/>
-              <a:t> / </a:t>
-            </a:r>
-            <a:r>
-              <a:rPr lang="ja-JP" altLang="en-US" sz="3200"/>
-              <a:t>５人チームでのグループワークを行なった</a:t>
-            </a:r>
-            <a:endParaRPr lang="en-US" altLang="ja-JP" sz="3200" dirty="0"/>
-          </a:p>
-          <a:p>
-            <a:r>
-              <a:rPr lang="ja-JP" altLang="en-US" sz="4000"/>
-              <a:t>演習で実際に行なってみましょう！</a:t>
-            </a:r>
-            <a:endParaRPr lang="en-US" altLang="ja" sz="4000" dirty="0"/>
-          </a:p>
-          <a:p>
-            <a:pPr lvl="1"/>
-            <a:endParaRPr lang="en-US" altLang="ja-JP" dirty="0"/>
-          </a:p>
-          <a:p>
-            <a:endParaRPr lang="en-US" altLang="ja-JP" dirty="0"/>
-          </a:p>
-          <a:p>
-            <a:endParaRPr lang="en-US" altLang="ja-JP" dirty="0"/>
-          </a:p>
-          <a:p>
-            <a:endParaRPr lang="en-US" altLang="ja-JP" sz="4000" dirty="0"/>
-          </a:p>
-        </p:txBody>
-      </p:sp>
-      <p:sp>
-        <p:nvSpPr>
-          <p:cNvPr id="13" name="Slide Number Placeholder 12">
+              <a:rPr lang="ja" altLang="en-US" sz="4200" dirty="0"/>
+              <a:t>自己紹介</a:t>
+            </a:r>
+            <a:endParaRPr lang="en-US" altLang="ja" sz="4200" dirty="0"/>
+          </a:p>
+          <a:p>
+            <a:r>
+              <a:rPr lang="ja-JP" altLang="en-US" sz="4200"/>
+              <a:t>データ</a:t>
+            </a:r>
+            <a:r>
+              <a:rPr lang="ja" altLang="en-US" sz="4200" dirty="0"/>
+              <a:t>アントレプレナーフェロープログラム</a:t>
+            </a:r>
+            <a:endParaRPr lang="en-US" altLang="ja-JP" sz="4200" dirty="0"/>
+          </a:p>
+          <a:p>
+            <a:r>
+              <a:rPr kumimoji="1" lang="ja" altLang="en-US" sz="4200" dirty="0"/>
+              <a:t>データアントレプレナー</a:t>
+            </a:r>
+            <a:r>
+              <a:rPr kumimoji="1" lang="ja-JP" altLang="en-US" sz="4200"/>
+              <a:t>実践論</a:t>
+            </a:r>
+            <a:endParaRPr kumimoji="1" lang="en-US" altLang="ja-JP" sz="4200" dirty="0"/>
+          </a:p>
+          <a:p>
+            <a:r>
+              <a:rPr kumimoji="1" lang="ja" altLang="en-US" sz="4200" dirty="0">
+                <a:solidFill>
+                  <a:schemeClr val="accent1"/>
+                </a:solidFill>
+              </a:rPr>
+              <a:t>データサイエンティスト</a:t>
+            </a:r>
+            <a:r>
+              <a:rPr kumimoji="1" lang="ja-JP" altLang="en-US" sz="4200">
+                <a:solidFill>
+                  <a:schemeClr val="accent1"/>
+                </a:solidFill>
+              </a:rPr>
+              <a:t>特論</a:t>
+            </a:r>
+            <a:endParaRPr kumimoji="1" lang="en-US" altLang="ja-JP" sz="4200" dirty="0">
+              <a:solidFill>
+                <a:schemeClr val="accent1"/>
+              </a:solidFill>
+            </a:endParaRPr>
+          </a:p>
+          <a:p>
+            <a:r>
+              <a:rPr lang="ja-JP" altLang="en-US" sz="4400"/>
+              <a:t>データ分析の目的、必要性</a:t>
+            </a:r>
+            <a:endParaRPr kumimoji="1" lang="en-US" altLang="ja-JP" sz="4200" dirty="0">
+              <a:solidFill>
+                <a:schemeClr val="accent1"/>
+              </a:solidFill>
+            </a:endParaRPr>
+          </a:p>
+        </p:txBody>
+      </p:sp>
+      <p:sp>
+        <p:nvSpPr>
+          <p:cNvPr id="4" name="Slide Number Placeholder 3">
             <a:extLst>
               <a:ext uri="{FF2B5EF4-FFF2-40B4-BE49-F238E27FC236}">
-                <a16:creationId xmlns:a16="http://schemas.microsoft.com/office/drawing/2014/main" id="{ACBC7515-E64F-8F4C-B7BA-458E3BC7E0CA}"/>
+                <a16:creationId xmlns:a16="http://schemas.microsoft.com/office/drawing/2014/main" id="{E857C27F-31E3-FD4B-B90C-CF6CDEEDFC7A}"/>
               </a:ext>
             </a:extLst>
           </p:cNvPr>
@@ -17056,10 +17050,10 @@
       </p:sp>
       <p:sp>
         <p:nvSpPr>
-          <p:cNvPr id="14" name="Footer Placeholder 13">
+          <p:cNvPr id="7" name="Footer Placeholder 6">
             <a:extLst>
               <a:ext uri="{FF2B5EF4-FFF2-40B4-BE49-F238E27FC236}">
-                <a16:creationId xmlns:a16="http://schemas.microsoft.com/office/drawing/2014/main" id="{6848FA93-3DF9-3B45-9537-C5287D7DA562}"/>
+                <a16:creationId xmlns:a16="http://schemas.microsoft.com/office/drawing/2014/main" id="{AE558B7F-26E7-DD4F-84D7-E1D64CC93010}"/>
               </a:ext>
             </a:extLst>
           </p:cNvPr>
@@ -17070,12 +17064,7 @@
             <p:ph type="ftr" sz="quarter" idx="11"/>
           </p:nvPr>
         </p:nvSpPr>
-        <p:spPr>
-          <a:xfrm>
-            <a:off x="10680700" y="9621838"/>
-            <a:ext cx="6172200" cy="547687"/>
-          </a:xfrm>
-        </p:spPr>
+        <p:spPr/>
         <p:txBody>
           <a:bodyPr/>
           <a:lstStyle/>
@@ -17091,7 +17080,7 @@
     </p:spTree>
     <p:extLst>
       <p:ext uri="{BB962C8B-B14F-4D97-AF65-F5344CB8AC3E}">
-        <p14:creationId xmlns:p14="http://schemas.microsoft.com/office/powerpoint/2010/main" val="3433858019"/>
+        <p14:creationId xmlns:p14="http://schemas.microsoft.com/office/powerpoint/2010/main" val="1249649557"/>
       </p:ext>
     </p:extLst>
   </p:cSld>
@@ -17120,7 +17109,7 @@
       </p:grpSpPr>
       <p:sp>
         <p:nvSpPr>
-          <p:cNvPr id="5" name="タイトル 4"/>
+          <p:cNvPr id="9" name="タイトル 8"/>
           <p:cNvSpPr>
             <a:spLocks noGrp="1"/>
           </p:cNvSpPr>
@@ -17136,15 +17125,22 @@
           <a:lstStyle/>
           <a:p>
             <a:r>
-              <a:rPr kumimoji="1" lang="ja-JP" altLang="en-US" sz="6600" dirty="0"/>
-              <a:t>コンテンツ</a:t>
-            </a:r>
-          </a:p>
-        </p:txBody>
-      </p:sp>
-      <p:sp>
-        <p:nvSpPr>
-          <p:cNvPr id="6" name="テキスト プレースホルダー 5"/>
+              <a:rPr kumimoji="1" lang="ja-JP" altLang="en-US"/>
+              <a:t>データサイエンティスト特論</a:t>
+            </a:r>
+            <a:endParaRPr kumimoji="1" lang="ja-JP" altLang="en-US" dirty="0"/>
+          </a:p>
+        </p:txBody>
+      </p:sp>
+      <p:sp>
+        <p:nvSpPr>
+          <p:cNvPr id="15" name="テキスト プレースホルダー 9">
+            <a:extLst>
+              <a:ext uri="{FF2B5EF4-FFF2-40B4-BE49-F238E27FC236}">
+                <a16:creationId xmlns:a16="http://schemas.microsoft.com/office/drawing/2014/main" id="{98F5EB82-97F4-BE48-8A01-5935D01BB0CD}"/>
+              </a:ext>
+            </a:extLst>
+          </p:cNvPr>
           <p:cNvSpPr>
             <a:spLocks noGrp="1"/>
           </p:cNvSpPr>
@@ -17154,8 +17150,8 @@
         </p:nvSpPr>
         <p:spPr>
           <a:xfrm>
-            <a:off x="7709647" y="1783556"/>
-            <a:ext cx="10578353" cy="6718300"/>
+            <a:off x="1596035" y="3725602"/>
+            <a:ext cx="16534150" cy="6698755"/>
           </a:xfrm>
         </p:spPr>
         <p:txBody>
@@ -17165,67 +17161,122 @@
           <a:lstStyle/>
           <a:p>
             <a:r>
-              <a:rPr lang="ja" altLang="en-US" sz="4200" dirty="0"/>
-              <a:t>自己紹介</a:t>
-            </a:r>
-            <a:endParaRPr lang="en-US" altLang="ja" sz="4200" dirty="0"/>
-          </a:p>
-          <a:p>
-            <a:r>
-              <a:rPr lang="ja-JP" altLang="en-US" sz="4200"/>
-              <a:t>データ</a:t>
-            </a:r>
-            <a:r>
-              <a:rPr lang="ja" altLang="en-US" sz="4200" dirty="0"/>
-              <a:t>アントレプレナーフェロープログラム</a:t>
-            </a:r>
-            <a:endParaRPr lang="en-US" altLang="ja-JP" sz="4200" dirty="0"/>
-          </a:p>
-          <a:p>
-            <a:r>
-              <a:rPr kumimoji="1" lang="ja" altLang="en-US" sz="4200" dirty="0"/>
-              <a:t>データアントレプレナー</a:t>
-            </a:r>
-            <a:r>
-              <a:rPr kumimoji="1" lang="ja-JP" altLang="en-US" sz="4200"/>
-              <a:t>実践論</a:t>
-            </a:r>
-            <a:endParaRPr kumimoji="1" lang="en-US" altLang="ja-JP" sz="4200" dirty="0"/>
-          </a:p>
-          <a:p>
-            <a:r>
-              <a:rPr kumimoji="1" lang="ja" altLang="en-US" sz="4200" dirty="0"/>
-              <a:t>データサイエンティスト</a:t>
-            </a:r>
-            <a:r>
-              <a:rPr kumimoji="1" lang="ja-JP" altLang="en-US" sz="4200"/>
-              <a:t>特論</a:t>
-            </a:r>
-            <a:endParaRPr kumimoji="1" lang="en-US" altLang="ja-JP" sz="4200" dirty="0"/>
-          </a:p>
-          <a:p>
-            <a:r>
-              <a:rPr lang="ja-JP" altLang="en-US" sz="4400">
-                <a:solidFill>
-                  <a:schemeClr val="accent1"/>
-                </a:solidFill>
-              </a:rPr>
-              <a:t>データ分析の目的、必要性</a:t>
-            </a:r>
-            <a:endParaRPr kumimoji="1" lang="en-US" altLang="ja-JP" sz="4200" dirty="0">
-              <a:solidFill>
-                <a:schemeClr val="accent1"/>
-              </a:solidFill>
-            </a:endParaRPr>
-          </a:p>
-        </p:txBody>
-      </p:sp>
-      <p:sp>
-        <p:nvSpPr>
-          <p:cNvPr id="4" name="Slide Number Placeholder 3">
+              <a:rPr lang="ja-JP" altLang="en-US" sz="4000"/>
+              <a:t>実際の</a:t>
+            </a:r>
+            <a:r>
+              <a:rPr lang="ja" altLang="en-US" sz="4000" dirty="0"/>
+              <a:t>不動産データを</a:t>
+            </a:r>
+            <a:r>
+              <a:rPr lang="ja-JP" altLang="en-US" sz="4000"/>
+              <a:t>分析する</a:t>
+            </a:r>
+            <a:endParaRPr lang="en-US" altLang="ja-JP" sz="4000" dirty="0"/>
+          </a:p>
+          <a:p>
+            <a:pPr lvl="1"/>
+            <a:r>
+              <a:rPr lang="ja-JP" altLang="en-US" sz="3200"/>
+              <a:t>アメリカ，ワシントン</a:t>
+            </a:r>
+            <a:r>
+              <a:rPr lang="en-US" altLang="ja-JP" sz="3200" dirty="0"/>
+              <a:t>DC</a:t>
+            </a:r>
+            <a:r>
+              <a:rPr lang="ja-JP" altLang="en-US" sz="3200"/>
+              <a:t>の実データを分析した</a:t>
+            </a:r>
+            <a:endParaRPr lang="en-US" altLang="ja-JP" sz="3200" dirty="0"/>
+          </a:p>
+          <a:p>
+            <a:pPr lvl="1"/>
+            <a:r>
+              <a:rPr lang="ja-JP" altLang="en-US" sz="3200"/>
+              <a:t>データを分析して，データの特徴や，不動産の知識をつかむ</a:t>
+            </a:r>
+            <a:endParaRPr lang="en-US" altLang="ja-JP" sz="3200" dirty="0"/>
+          </a:p>
+          <a:p>
+            <a:r>
+              <a:rPr lang="ja-JP" altLang="en-US" sz="4000"/>
+              <a:t>物件価格の予測をする</a:t>
+            </a:r>
+            <a:endParaRPr lang="en-US" altLang="ja-JP" sz="4000" dirty="0"/>
+          </a:p>
+          <a:p>
+            <a:pPr lvl="1"/>
+            <a:r>
+              <a:rPr lang="ja" altLang="en-US" sz="3200" dirty="0"/>
+              <a:t>機械学習モデル</a:t>
+            </a:r>
+            <a:r>
+              <a:rPr lang="ja-JP" altLang="en-US" sz="3200"/>
+              <a:t>を用いて，精度の高い</a:t>
+            </a:r>
+            <a:r>
+              <a:rPr lang="ja" altLang="en-US" sz="3200" dirty="0"/>
+              <a:t>予測モデルを</a:t>
+            </a:r>
+            <a:r>
+              <a:rPr lang="ja-JP" altLang="en-US" sz="3200"/>
+              <a:t>作ることが</a:t>
+            </a:r>
+            <a:r>
+              <a:rPr lang="ja" altLang="en-US" sz="3200" dirty="0"/>
+              <a:t>コンペティション</a:t>
+            </a:r>
+            <a:r>
+              <a:rPr lang="ja-JP" altLang="en-US" sz="3200"/>
+              <a:t>の目標</a:t>
+            </a:r>
+            <a:endParaRPr lang="en-US" altLang="ja-JP" sz="3200" dirty="0"/>
+          </a:p>
+          <a:p>
+            <a:pPr lvl="1"/>
+            <a:r>
+              <a:rPr lang="ja-JP" altLang="en-US" sz="3200"/>
+              <a:t>４０人クラス</a:t>
+            </a:r>
+            <a:r>
+              <a:rPr lang="en-US" altLang="ja-JP" sz="3200" dirty="0"/>
+              <a:t> / </a:t>
+            </a:r>
+            <a:r>
+              <a:rPr lang="ja-JP" altLang="en-US" sz="3200"/>
+              <a:t>５人チームでのグループワークを行なった</a:t>
+            </a:r>
+            <a:endParaRPr lang="en-US" altLang="ja-JP" sz="3200" dirty="0"/>
+          </a:p>
+          <a:p>
+            <a:r>
+              <a:rPr lang="ja-JP" altLang="en-US" sz="4000"/>
+              <a:t>演習で実際に行なってみましょう！</a:t>
+            </a:r>
+            <a:endParaRPr lang="en-US" altLang="ja" sz="4000" dirty="0"/>
+          </a:p>
+          <a:p>
+            <a:pPr lvl="1"/>
+            <a:endParaRPr lang="en-US" altLang="ja-JP" dirty="0"/>
+          </a:p>
+          <a:p>
+            <a:endParaRPr lang="en-US" altLang="ja-JP" dirty="0"/>
+          </a:p>
+          <a:p>
+            <a:endParaRPr lang="en-US" altLang="ja-JP" dirty="0"/>
+          </a:p>
+          <a:p>
+            <a:endParaRPr lang="en-US" altLang="ja-JP" sz="4000" dirty="0"/>
+          </a:p>
+        </p:txBody>
+      </p:sp>
+      <p:sp>
+        <p:nvSpPr>
+          <p:cNvPr id="13" name="Slide Number Placeholder 12">
             <a:extLst>
               <a:ext uri="{FF2B5EF4-FFF2-40B4-BE49-F238E27FC236}">
-                <a16:creationId xmlns:a16="http://schemas.microsoft.com/office/drawing/2014/main" id="{E857C27F-31E3-FD4B-B90C-CF6CDEEDFC7A}"/>
+                <a16:creationId xmlns:a16="http://schemas.microsoft.com/office/drawing/2014/main" id="{ACBC7515-E64F-8F4C-B7BA-458E3BC7E0CA}"/>
               </a:ext>
             </a:extLst>
           </p:cNvPr>
@@ -17252,10 +17303,10 @@
       </p:sp>
       <p:sp>
         <p:nvSpPr>
-          <p:cNvPr id="7" name="Footer Placeholder 6">
+          <p:cNvPr id="14" name="Footer Placeholder 13">
             <a:extLst>
               <a:ext uri="{FF2B5EF4-FFF2-40B4-BE49-F238E27FC236}">
-                <a16:creationId xmlns:a16="http://schemas.microsoft.com/office/drawing/2014/main" id="{AE558B7F-26E7-DD4F-84D7-E1D64CC93010}"/>
+                <a16:creationId xmlns:a16="http://schemas.microsoft.com/office/drawing/2014/main" id="{6848FA93-3DF9-3B45-9537-C5287D7DA562}"/>
               </a:ext>
             </a:extLst>
           </p:cNvPr>
@@ -17266,7 +17317,12 @@
             <p:ph type="ftr" sz="quarter" idx="11"/>
           </p:nvPr>
         </p:nvSpPr>
-        <p:spPr/>
+        <p:spPr>
+          <a:xfrm>
+            <a:off x="10680700" y="9621838"/>
+            <a:ext cx="6172200" cy="547687"/>
+          </a:xfrm>
+        </p:spPr>
         <p:txBody>
           <a:bodyPr/>
           <a:lstStyle/>
@@ -17282,7 +17338,7 @@
     </p:spTree>
     <p:extLst>
       <p:ext uri="{BB962C8B-B14F-4D97-AF65-F5344CB8AC3E}">
-        <p14:creationId xmlns:p14="http://schemas.microsoft.com/office/powerpoint/2010/main" val="3308717264"/>
+        <p14:creationId xmlns:p14="http://schemas.microsoft.com/office/powerpoint/2010/main" val="3433858019"/>
       </p:ext>
     </p:extLst>
   </p:cSld>
@@ -17311,7 +17367,7 @@
       </p:grpSpPr>
       <p:sp>
         <p:nvSpPr>
-          <p:cNvPr id="9" name="タイトル 8"/>
+          <p:cNvPr id="5" name="タイトル 4"/>
           <p:cNvSpPr>
             <a:spLocks noGrp="1"/>
           </p:cNvSpPr>
@@ -17327,22 +17383,15 @@
           <a:lstStyle/>
           <a:p>
             <a:r>
-              <a:rPr kumimoji="1" lang="ja-JP" altLang="en-US"/>
-              <a:t>データ分析の目的、必要性</a:t>
-            </a:r>
-            <a:endParaRPr kumimoji="1" lang="ja-JP" altLang="en-US" dirty="0"/>
-          </a:p>
-        </p:txBody>
-      </p:sp>
-      <p:sp>
-        <p:nvSpPr>
-          <p:cNvPr id="15" name="テキスト プレースホルダー 9">
-            <a:extLst>
-              <a:ext uri="{FF2B5EF4-FFF2-40B4-BE49-F238E27FC236}">
-                <a16:creationId xmlns:a16="http://schemas.microsoft.com/office/drawing/2014/main" id="{98F5EB82-97F4-BE48-8A01-5935D01BB0CD}"/>
-              </a:ext>
-            </a:extLst>
-          </p:cNvPr>
+              <a:rPr kumimoji="1" lang="ja-JP" altLang="en-US" sz="6600" dirty="0"/>
+              <a:t>コンテンツ</a:t>
+            </a:r>
+          </a:p>
+        </p:txBody>
+      </p:sp>
+      <p:sp>
+        <p:nvSpPr>
+          <p:cNvPr id="6" name="テキスト プレースホルダー 5"/>
           <p:cNvSpPr>
             <a:spLocks noGrp="1"/>
           </p:cNvSpPr>
@@ -17352,8 +17401,8 @@
         </p:nvSpPr>
         <p:spPr>
           <a:xfrm>
-            <a:off x="1245850" y="2626432"/>
-            <a:ext cx="16534150" cy="5918258"/>
+            <a:off x="7709647" y="1783556"/>
+            <a:ext cx="10578353" cy="6718300"/>
           </a:xfrm>
         </p:spPr>
         <p:txBody>
@@ -17363,69 +17412,67 @@
           <a:lstStyle/>
           <a:p>
             <a:r>
-              <a:rPr lang="ja-JP" altLang="en-US" sz="4000"/>
-              <a:t>目的</a:t>
-            </a:r>
-            <a:endParaRPr lang="en-US" altLang="ja-JP" sz="4000" dirty="0"/>
-          </a:p>
-          <a:p>
-            <a:pPr lvl="1"/>
-            <a:r>
-              <a:rPr lang="ja-JP" altLang="en-US" sz="3200"/>
-              <a:t>意思決定の質を向上させる</a:t>
-            </a:r>
-            <a:endParaRPr lang="en-US" altLang="ja-JP" sz="3200" dirty="0"/>
-          </a:p>
-          <a:p>
-            <a:r>
-              <a:rPr lang="ja-JP" altLang="en-US" sz="4000"/>
-              <a:t>必要性</a:t>
-            </a:r>
-            <a:endParaRPr lang="en-US" altLang="ja-JP" sz="4000" dirty="0"/>
-          </a:p>
-          <a:p>
-            <a:pPr lvl="1"/>
-            <a:r>
-              <a:rPr lang="ja-JP" altLang="en-US" sz="3200"/>
-              <a:t>多くの人に論理的に説明ができる</a:t>
-            </a:r>
-            <a:endParaRPr lang="en-US" altLang="ja-JP" sz="3200" dirty="0"/>
-          </a:p>
-          <a:p>
-            <a:pPr lvl="1"/>
-            <a:r>
-              <a:rPr lang="ja-JP" altLang="en-US" sz="3200"/>
-              <a:t>経験や勘に頼らず、定量的な分析によって戦略を考える事ができる</a:t>
-            </a:r>
-            <a:endParaRPr lang="en-US" altLang="ja-JP" sz="3200" dirty="0"/>
-          </a:p>
-          <a:p>
-            <a:pPr lvl="1"/>
-            <a:r>
-              <a:rPr lang="ja-JP" altLang="en-US" sz="3200"/>
-              <a:t>戦略や施策の効果を検証できる</a:t>
-            </a:r>
-            <a:endParaRPr lang="en-US" altLang="ja-JP" sz="3200" dirty="0"/>
-          </a:p>
-          <a:p>
-            <a:pPr lvl="1"/>
-            <a:r>
-              <a:rPr lang="ja-JP" altLang="en-US" sz="3200"/>
-              <a:t>データから意思決定のための気づきを得る事ができる</a:t>
-            </a:r>
-            <a:endParaRPr lang="en-US" altLang="ja-JP" dirty="0"/>
-          </a:p>
-          <a:p>
-            <a:endParaRPr lang="en-US" altLang="ja-JP" sz="4000" dirty="0"/>
-          </a:p>
-        </p:txBody>
-      </p:sp>
-      <p:sp>
-        <p:nvSpPr>
-          <p:cNvPr id="13" name="Slide Number Placeholder 12">
+              <a:rPr lang="ja" altLang="en-US" sz="4200" dirty="0"/>
+              <a:t>自己紹介</a:t>
+            </a:r>
+            <a:endParaRPr lang="en-US" altLang="ja" sz="4200" dirty="0"/>
+          </a:p>
+          <a:p>
+            <a:r>
+              <a:rPr lang="ja-JP" altLang="en-US" sz="4200"/>
+              <a:t>データ</a:t>
+            </a:r>
+            <a:r>
+              <a:rPr lang="ja" altLang="en-US" sz="4200" dirty="0"/>
+              <a:t>アントレプレナーフェロープログラム</a:t>
+            </a:r>
+            <a:endParaRPr lang="en-US" altLang="ja-JP" sz="4200" dirty="0"/>
+          </a:p>
+          <a:p>
+            <a:r>
+              <a:rPr kumimoji="1" lang="ja" altLang="en-US" sz="4200" dirty="0"/>
+              <a:t>データアントレプレナー</a:t>
+            </a:r>
+            <a:r>
+              <a:rPr kumimoji="1" lang="ja-JP" altLang="en-US" sz="4200"/>
+              <a:t>実践論</a:t>
+            </a:r>
+            <a:endParaRPr kumimoji="1" lang="en-US" altLang="ja-JP" sz="4200" dirty="0"/>
+          </a:p>
+          <a:p>
+            <a:r>
+              <a:rPr kumimoji="1" lang="ja" altLang="en-US" sz="4200" dirty="0"/>
+              <a:t>データサイエンティスト</a:t>
+            </a:r>
+            <a:r>
+              <a:rPr kumimoji="1" lang="ja-JP" altLang="en-US" sz="4200"/>
+              <a:t>特論</a:t>
+            </a:r>
+            <a:endParaRPr kumimoji="1" lang="en-US" altLang="ja-JP" sz="4200" dirty="0"/>
+          </a:p>
+          <a:p>
+            <a:r>
+              <a:rPr lang="ja-JP" altLang="en-US" sz="4400">
+                <a:solidFill>
+                  <a:schemeClr val="accent1"/>
+                </a:solidFill>
+              </a:rPr>
+              <a:t>データ分析の目的、必要性</a:t>
+            </a:r>
+            <a:endParaRPr kumimoji="1" lang="en-US" altLang="ja-JP" sz="4200" dirty="0">
+              <a:solidFill>
+                <a:schemeClr val="accent1"/>
+              </a:solidFill>
+            </a:endParaRPr>
+          </a:p>
+        </p:txBody>
+      </p:sp>
+      <p:sp>
+        <p:nvSpPr>
+          <p:cNvPr id="4" name="Slide Number Placeholder 3">
             <a:extLst>
               <a:ext uri="{FF2B5EF4-FFF2-40B4-BE49-F238E27FC236}">
-                <a16:creationId xmlns:a16="http://schemas.microsoft.com/office/drawing/2014/main" id="{ACBC7515-E64F-8F4C-B7BA-458E3BC7E0CA}"/>
+                <a16:creationId xmlns:a16="http://schemas.microsoft.com/office/drawing/2014/main" id="{E857C27F-31E3-FD4B-B90C-CF6CDEEDFC7A}"/>
               </a:ext>
             </a:extLst>
           </p:cNvPr>
@@ -17452,10 +17499,10 @@
       </p:sp>
       <p:sp>
         <p:nvSpPr>
-          <p:cNvPr id="14" name="Footer Placeholder 13">
+          <p:cNvPr id="7" name="Footer Placeholder 6">
             <a:extLst>
               <a:ext uri="{FF2B5EF4-FFF2-40B4-BE49-F238E27FC236}">
-                <a16:creationId xmlns:a16="http://schemas.microsoft.com/office/drawing/2014/main" id="{6848FA93-3DF9-3B45-9537-C5287D7DA562}"/>
+                <a16:creationId xmlns:a16="http://schemas.microsoft.com/office/drawing/2014/main" id="{AE558B7F-26E7-DD4F-84D7-E1D64CC93010}"/>
               </a:ext>
             </a:extLst>
           </p:cNvPr>
@@ -17466,12 +17513,7 @@
             <p:ph type="ftr" sz="quarter" idx="11"/>
           </p:nvPr>
         </p:nvSpPr>
-        <p:spPr>
-          <a:xfrm>
-            <a:off x="10680700" y="9621838"/>
-            <a:ext cx="6172200" cy="547687"/>
-          </a:xfrm>
-        </p:spPr>
+        <p:spPr/>
         <p:txBody>
           <a:bodyPr/>
           <a:lstStyle/>
@@ -17487,7 +17529,7 @@
     </p:spTree>
     <p:extLst>
       <p:ext uri="{BB962C8B-B14F-4D97-AF65-F5344CB8AC3E}">
-        <p14:creationId xmlns:p14="http://schemas.microsoft.com/office/powerpoint/2010/main" val="2418133671"/>
+        <p14:creationId xmlns:p14="http://schemas.microsoft.com/office/powerpoint/2010/main" val="3308717264"/>
       </p:ext>
     </p:extLst>
   </p:cSld>
@@ -17557,7 +17599,7 @@
         </p:nvSpPr>
         <p:spPr>
           <a:xfrm>
-            <a:off x="1080750" y="115855"/>
+            <a:off x="1245850" y="2626432"/>
             <a:ext cx="16534150" cy="5918258"/>
           </a:xfrm>
         </p:spPr>
@@ -17567,12 +17609,24 @@
           </a:bodyPr>
           <a:lstStyle/>
           <a:p>
+            <a:r>
+              <a:rPr lang="ja-JP" altLang="en-US" sz="4000"/>
+              <a:t>目的</a:t>
+            </a:r>
             <a:endParaRPr lang="en-US" altLang="ja-JP" sz="4000" dirty="0"/>
           </a:p>
           <a:p>
+            <a:pPr lvl="1"/>
+            <a:r>
+              <a:rPr lang="ja-JP" altLang="en-US" sz="3200"/>
+              <a:t>意思決定の質を向上させる</a:t>
+            </a:r>
+            <a:endParaRPr lang="en-US" altLang="ja-JP" sz="3200" dirty="0"/>
+          </a:p>
+          <a:p>
             <a:r>
               <a:rPr lang="ja-JP" altLang="en-US" sz="4000"/>
-              <a:t>ウォルマートの例</a:t>
+              <a:t>必要性</a:t>
             </a:r>
             <a:endParaRPr lang="en-US" altLang="ja-JP" sz="4000" dirty="0"/>
           </a:p>
@@ -17580,15 +17634,36 @@
             <a:pPr lvl="1"/>
             <a:r>
               <a:rPr lang="ja-JP" altLang="en-US" sz="3200"/>
-              <a:t>ハリケーンの前にストロベリーポップタルトが多く売れる</a:t>
-            </a:r>
-            <a:r>
-              <a:rPr lang="en-US" sz="3200" dirty="0">
-                <a:hlinkClick r:id="rId2"/>
-              </a:rPr>
-              <a:t>https://www.nytimes.com/2004/11/14/business/yourmoney/what-walmart-knows-about-customers-habits.html</a:t>
+              <a:t>多くの人に論理的に説明ができる</a:t>
             </a:r>
             <a:endParaRPr lang="en-US" altLang="ja-JP" sz="3200" dirty="0"/>
+          </a:p>
+          <a:p>
+            <a:pPr lvl="1"/>
+            <a:r>
+              <a:rPr lang="ja-JP" altLang="en-US" sz="3200"/>
+              <a:t>経験や勘に頼らず、定量的な分析によって戦略を考える事ができる</a:t>
+            </a:r>
+            <a:endParaRPr lang="en-US" altLang="ja-JP" sz="3200" dirty="0"/>
+          </a:p>
+          <a:p>
+            <a:pPr lvl="1"/>
+            <a:r>
+              <a:rPr lang="ja-JP" altLang="en-US" sz="3200"/>
+              <a:t>戦略や施策の効果を検証できる</a:t>
+            </a:r>
+            <a:endParaRPr lang="en-US" altLang="ja-JP" sz="3200" dirty="0"/>
+          </a:p>
+          <a:p>
+            <a:pPr lvl="1"/>
+            <a:r>
+              <a:rPr lang="ja-JP" altLang="en-US" sz="3200"/>
+              <a:t>データから意思決定のための気づきを得る事ができる</a:t>
+            </a:r>
+            <a:endParaRPr lang="en-US" altLang="ja-JP" dirty="0"/>
+          </a:p>
+          <a:p>
+            <a:endParaRPr lang="en-US" altLang="ja-JP" sz="4000" dirty="0"/>
           </a:p>
         </p:txBody>
       </p:sp>
@@ -17617,6 +17692,178 @@
               <a:rPr kumimoji="1" lang="ja-JP" altLang="en-US" smtClean="0"/>
               <a:pPr/>
               <a:t>23</a:t>
+            </a:fld>
+            <a:endParaRPr kumimoji="1" lang="ja-JP" altLang="en-US"/>
+          </a:p>
+        </p:txBody>
+      </p:sp>
+      <p:sp>
+        <p:nvSpPr>
+          <p:cNvPr id="14" name="Footer Placeholder 13">
+            <a:extLst>
+              <a:ext uri="{FF2B5EF4-FFF2-40B4-BE49-F238E27FC236}">
+                <a16:creationId xmlns:a16="http://schemas.microsoft.com/office/drawing/2014/main" id="{6848FA93-3DF9-3B45-9537-C5287D7DA562}"/>
+              </a:ext>
+            </a:extLst>
+          </p:cNvPr>
+          <p:cNvSpPr>
+            <a:spLocks noGrp="1"/>
+          </p:cNvSpPr>
+          <p:nvPr>
+            <p:ph type="ftr" sz="quarter" idx="11"/>
+          </p:nvPr>
+        </p:nvSpPr>
+        <p:spPr>
+          <a:xfrm>
+            <a:off x="10680700" y="9621838"/>
+            <a:ext cx="6172200" cy="547687"/>
+          </a:xfrm>
+        </p:spPr>
+        <p:txBody>
+          <a:bodyPr/>
+          <a:lstStyle/>
+          <a:p>
+            <a:r>
+              <a:rPr kumimoji="1" lang="en-US" altLang="ja-JP"/>
+              <a:t>@Takato Matsumoto, 2020</a:t>
+            </a:r>
+            <a:endParaRPr kumimoji="1" lang="ja-JP" altLang="en-US" dirty="0"/>
+          </a:p>
+        </p:txBody>
+      </p:sp>
+    </p:spTree>
+    <p:extLst>
+      <p:ext uri="{BB962C8B-B14F-4D97-AF65-F5344CB8AC3E}">
+        <p14:creationId xmlns:p14="http://schemas.microsoft.com/office/powerpoint/2010/main" val="2418133671"/>
+      </p:ext>
+    </p:extLst>
+  </p:cSld>
+  <p:clrMapOvr>
+    <a:masterClrMapping/>
+  </p:clrMapOvr>
+</p:sld>
+</file>
+
+<file path=ppt/slides/slide24.xml><?xml version="1.0" encoding="utf-8"?>
+<p:sld xmlns:a="http://schemas.openxmlformats.org/drawingml/2006/main" xmlns:r="http://schemas.openxmlformats.org/officeDocument/2006/relationships" xmlns:p="http://schemas.openxmlformats.org/presentationml/2006/main">
+  <p:cSld>
+    <p:spTree>
+      <p:nvGrpSpPr>
+        <p:cNvPr id="1" name=""/>
+        <p:cNvGrpSpPr/>
+        <p:nvPr/>
+      </p:nvGrpSpPr>
+      <p:grpSpPr>
+        <a:xfrm>
+          <a:off x="0" y="0"/>
+          <a:ext cx="0" cy="0"/>
+          <a:chOff x="0" y="0"/>
+          <a:chExt cx="0" cy="0"/>
+        </a:xfrm>
+      </p:grpSpPr>
+      <p:sp>
+        <p:nvSpPr>
+          <p:cNvPr id="9" name="タイトル 8"/>
+          <p:cNvSpPr>
+            <a:spLocks noGrp="1"/>
+          </p:cNvSpPr>
+          <p:nvPr>
+            <p:ph type="title"/>
+          </p:nvPr>
+        </p:nvSpPr>
+        <p:spPr/>
+        <p:txBody>
+          <a:bodyPr>
+            <a:normAutofit/>
+          </a:bodyPr>
+          <a:lstStyle/>
+          <a:p>
+            <a:r>
+              <a:rPr kumimoji="1" lang="ja-JP" altLang="en-US"/>
+              <a:t>データ分析の目的、必要性</a:t>
+            </a:r>
+            <a:endParaRPr kumimoji="1" lang="ja-JP" altLang="en-US" dirty="0"/>
+          </a:p>
+        </p:txBody>
+      </p:sp>
+      <p:sp>
+        <p:nvSpPr>
+          <p:cNvPr id="15" name="テキスト プレースホルダー 9">
+            <a:extLst>
+              <a:ext uri="{FF2B5EF4-FFF2-40B4-BE49-F238E27FC236}">
+                <a16:creationId xmlns:a16="http://schemas.microsoft.com/office/drawing/2014/main" id="{98F5EB82-97F4-BE48-8A01-5935D01BB0CD}"/>
+              </a:ext>
+            </a:extLst>
+          </p:cNvPr>
+          <p:cNvSpPr>
+            <a:spLocks noGrp="1"/>
+          </p:cNvSpPr>
+          <p:nvPr>
+            <p:ph type="body" sz="quarter" idx="12"/>
+          </p:nvPr>
+        </p:nvSpPr>
+        <p:spPr>
+          <a:xfrm>
+            <a:off x="1080750" y="115855"/>
+            <a:ext cx="16534150" cy="5918258"/>
+          </a:xfrm>
+        </p:spPr>
+        <p:txBody>
+          <a:bodyPr>
+            <a:normAutofit/>
+          </a:bodyPr>
+          <a:lstStyle/>
+          <a:p>
+            <a:endParaRPr lang="en-US" altLang="ja-JP" sz="4000" dirty="0"/>
+          </a:p>
+          <a:p>
+            <a:r>
+              <a:rPr lang="ja-JP" altLang="en-US" sz="4000"/>
+              <a:t>ウォルマートの例</a:t>
+            </a:r>
+            <a:endParaRPr lang="en-US" altLang="ja-JP" sz="4000" dirty="0"/>
+          </a:p>
+          <a:p>
+            <a:pPr lvl="1"/>
+            <a:r>
+              <a:rPr lang="ja-JP" altLang="en-US" sz="3200"/>
+              <a:t>ハリケーンの前にストロベリーポップタルトが多く売れる</a:t>
+            </a:r>
+            <a:r>
+              <a:rPr lang="en-US" sz="3200" dirty="0">
+                <a:hlinkClick r:id="rId2"/>
+              </a:rPr>
+              <a:t>https://www.nytimes.com/2004/11/14/business/yourmoney/what-walmart-knows-about-customers-habits.html</a:t>
+            </a:r>
+            <a:endParaRPr lang="en-US" altLang="ja-JP" sz="3200" dirty="0"/>
+          </a:p>
+        </p:txBody>
+      </p:sp>
+      <p:sp>
+        <p:nvSpPr>
+          <p:cNvPr id="13" name="Slide Number Placeholder 12">
+            <a:extLst>
+              <a:ext uri="{FF2B5EF4-FFF2-40B4-BE49-F238E27FC236}">
+                <a16:creationId xmlns:a16="http://schemas.microsoft.com/office/drawing/2014/main" id="{ACBC7515-E64F-8F4C-B7BA-458E3BC7E0CA}"/>
+              </a:ext>
+            </a:extLst>
+          </p:cNvPr>
+          <p:cNvSpPr>
+            <a:spLocks noGrp="1"/>
+          </p:cNvSpPr>
+          <p:nvPr>
+            <p:ph type="sldNum" sz="quarter" idx="10"/>
+          </p:nvPr>
+        </p:nvSpPr>
+        <p:spPr/>
+        <p:txBody>
+          <a:bodyPr/>
+          <a:lstStyle/>
+          <a:p>
+            <a:fld id="{D28C7C6D-0F52-4FBA-8358-35C6083C2133}" type="slidenum">
+              <a:rPr kumimoji="1" lang="ja-JP" altLang="en-US" smtClean="0"/>
+              <a:pPr/>
+              <a:t>24</a:t>
             </a:fld>
             <a:endParaRPr kumimoji="1" lang="ja-JP" altLang="en-US"/>
           </a:p>
@@ -17833,7 +18080,7 @@
       </p:grpSpPr>
       <p:sp>
         <p:nvSpPr>
-          <p:cNvPr id="5" name="タイトル 4"/>
+          <p:cNvPr id="9" name="タイトル 8"/>
           <p:cNvSpPr>
             <a:spLocks noGrp="1"/>
           </p:cNvSpPr>
@@ -17841,7 +18088,40 @@
             <p:ph type="title"/>
           </p:nvPr>
         </p:nvSpPr>
-        <p:spPr/>
+        <p:spPr>
+          <a:xfrm>
+            <a:off x="927100" y="471404"/>
+            <a:ext cx="16687800" cy="1077996"/>
+          </a:xfrm>
+        </p:spPr>
+        <p:txBody>
+          <a:bodyPr/>
+          <a:lstStyle/>
+          <a:p>
+            <a:r>
+              <a:rPr lang="ja-JP" altLang="en-US"/>
+              <a:t>質問について</a:t>
+            </a:r>
+            <a:endParaRPr kumimoji="1" lang="ja-JP" altLang="en-US" dirty="0"/>
+          </a:p>
+        </p:txBody>
+      </p:sp>
+      <p:sp>
+        <p:nvSpPr>
+          <p:cNvPr id="10" name="テキスト プレースホルダー 9"/>
+          <p:cNvSpPr>
+            <a:spLocks noGrp="1"/>
+          </p:cNvSpPr>
+          <p:nvPr>
+            <p:ph type="body" sz="quarter" idx="12"/>
+          </p:nvPr>
+        </p:nvSpPr>
+        <p:spPr>
+          <a:xfrm>
+            <a:off x="6396786" y="1967320"/>
+            <a:ext cx="11923868" cy="8072438"/>
+          </a:xfrm>
+        </p:spPr>
         <p:txBody>
           <a:bodyPr>
             <a:normAutofit/>
@@ -17849,88 +18129,111 @@
           <a:lstStyle/>
           <a:p>
             <a:r>
-              <a:rPr kumimoji="1" lang="ja-JP" altLang="en-US" sz="6600" dirty="0"/>
-              <a:t>コンテンツ</a:t>
-            </a:r>
-          </a:p>
-        </p:txBody>
-      </p:sp>
-      <p:sp>
-        <p:nvSpPr>
-          <p:cNvPr id="6" name="テキスト プレースホルダー 5"/>
-          <p:cNvSpPr>
-            <a:spLocks noGrp="1"/>
-          </p:cNvSpPr>
-          <p:nvPr>
-            <p:ph type="body" sz="quarter" idx="12"/>
-          </p:nvPr>
-        </p:nvSpPr>
-        <p:spPr>
-          <a:xfrm>
-            <a:off x="7709647" y="1783556"/>
-            <a:ext cx="10578353" cy="6718300"/>
-          </a:xfrm>
-        </p:spPr>
-        <p:txBody>
-          <a:bodyPr>
-            <a:normAutofit/>
-          </a:bodyPr>
-          <a:lstStyle/>
-          <a:p>
-            <a:r>
-              <a:rPr lang="ja" altLang="en-US" sz="4200" dirty="0"/>
-              <a:t>自己紹介</a:t>
-            </a:r>
-            <a:endParaRPr lang="en-US" altLang="ja" sz="4200" dirty="0"/>
-          </a:p>
-          <a:p>
-            <a:r>
-              <a:rPr lang="ja-JP" altLang="en-US" sz="4200"/>
-              <a:t>データ</a:t>
-            </a:r>
-            <a:r>
-              <a:rPr lang="ja" altLang="en-US" sz="4200" dirty="0"/>
-              <a:t>アントレプレナーフェロープログラム</a:t>
-            </a:r>
-            <a:endParaRPr lang="en-US" altLang="ja-JP" sz="4200" dirty="0"/>
-          </a:p>
-          <a:p>
-            <a:r>
-              <a:rPr kumimoji="1" lang="ja" altLang="en-US" sz="4200" dirty="0"/>
-              <a:t>データアントレプレナー</a:t>
-            </a:r>
-            <a:r>
-              <a:rPr kumimoji="1" lang="ja-JP" altLang="en-US" sz="4200"/>
-              <a:t>実践論</a:t>
-            </a:r>
-            <a:endParaRPr kumimoji="1" lang="en-US" altLang="ja-JP" sz="4200" dirty="0"/>
-          </a:p>
-          <a:p>
-            <a:r>
-              <a:rPr kumimoji="1" lang="ja" altLang="en-US" sz="4200" dirty="0"/>
-              <a:t>データサイエンティスト</a:t>
-            </a:r>
-            <a:r>
-              <a:rPr kumimoji="1" lang="ja-JP" altLang="en-US" sz="4200"/>
-              <a:t>特論</a:t>
-            </a:r>
-            <a:endParaRPr kumimoji="1" lang="en-US" altLang="ja-JP" sz="4200" dirty="0"/>
-          </a:p>
-          <a:p>
-            <a:r>
-              <a:rPr lang="ja-JP" altLang="en-US" sz="4400"/>
-              <a:t>データ分析の目的、必要性</a:t>
-            </a:r>
-            <a:endParaRPr kumimoji="1" lang="en-US" altLang="ja-JP" sz="4200" dirty="0"/>
-          </a:p>
-        </p:txBody>
-      </p:sp>
-      <p:sp>
-        <p:nvSpPr>
-          <p:cNvPr id="4" name="Slide Number Placeholder 3">
+              <a:rPr lang="en-US" altLang="ja-JP" sz="5400" dirty="0" err="1"/>
+              <a:t>sil.do</a:t>
+            </a:r>
+            <a:r>
+              <a:rPr lang="ja-JP" altLang="en-US" sz="5400"/>
+              <a:t>で</a:t>
+            </a:r>
+            <a:r>
+              <a:rPr lang="ja" altLang="en-US" sz="5400" dirty="0"/>
+              <a:t>受け付けます</a:t>
+            </a:r>
+            <a:r>
+              <a:rPr lang="en-US" sz="5400" dirty="0">
+                <a:hlinkClick r:id="rId2"/>
+              </a:rPr>
+              <a:t>https://www.sli.do/</a:t>
+            </a:r>
+            <a:endParaRPr lang="en-US" sz="5400" dirty="0"/>
+          </a:p>
+          <a:p>
+            <a:r>
+              <a:rPr lang="en-US" altLang="zh-TW" sz="5400" dirty="0"/>
+              <a:t>Event code</a:t>
+            </a:r>
+            <a:br>
+              <a:rPr lang="en-US" altLang="zh-TW" sz="5400" dirty="0"/>
+            </a:br>
+            <a:r>
+              <a:rPr lang="en-US" altLang="ja" sz="5400" dirty="0">
+                <a:solidFill>
+                  <a:schemeClr val="accent2"/>
+                </a:solidFill>
+              </a:rPr>
+              <a:t># SA202</a:t>
+            </a:r>
+            <a:endParaRPr lang="en-US" altLang="ja-JP" sz="5400" dirty="0"/>
+          </a:p>
+          <a:p>
+            <a:r>
+              <a:rPr lang="ja-JP" altLang="en-US" sz="5400"/>
+              <a:t>ミーティングツールで質問が可能で</a:t>
+            </a:r>
+            <a:br>
+              <a:rPr lang="en-US" altLang="ja-JP" sz="5400" dirty="0"/>
+            </a:br>
+            <a:r>
+              <a:rPr lang="ja-JP" altLang="en-US" sz="5400"/>
+              <a:t>あればそちらでも大丈夫です</a:t>
+            </a:r>
+            <a:endParaRPr lang="en-US" altLang="ja-JP" sz="5400" dirty="0"/>
+          </a:p>
+          <a:p>
+            <a:pPr marL="557146" lvl="1" indent="0">
+              <a:buNone/>
+            </a:pPr>
+            <a:endParaRPr lang="en-US" altLang="ja" sz="5400" dirty="0">
+              <a:solidFill>
+                <a:schemeClr val="accent2"/>
+              </a:solidFill>
+            </a:endParaRPr>
+          </a:p>
+        </p:txBody>
+      </p:sp>
+      <p:pic>
+        <p:nvPicPr>
+          <p:cNvPr id="28" name="Picture 27">
             <a:extLst>
               <a:ext uri="{FF2B5EF4-FFF2-40B4-BE49-F238E27FC236}">
-                <a16:creationId xmlns:a16="http://schemas.microsoft.com/office/drawing/2014/main" id="{245B8BF2-989B-F944-AA36-2C3B20207F75}"/>
+                <a16:creationId xmlns:a16="http://schemas.microsoft.com/office/drawing/2014/main" id="{F4CEDB55-ADAA-614C-80CF-4FA821C24C85}"/>
+              </a:ext>
+            </a:extLst>
+          </p:cNvPr>
+          <p:cNvPicPr>
+            <a:picLocks noChangeAspect="1"/>
+          </p:cNvPicPr>
+          <p:nvPr/>
+        </p:nvPicPr>
+        <p:blipFill>
+          <a:blip r:embed="rId3">
+            <a:extLst>
+              <a:ext uri="{28A0092B-C50C-407E-A947-70E740481C1C}">
+                <a14:useLocalDpi xmlns:a14="http://schemas.microsoft.com/office/drawing/2010/main" val="0"/>
+              </a:ext>
+            </a:extLst>
+          </a:blip>
+          <a:stretch>
+            <a:fillRect/>
+          </a:stretch>
+        </p:blipFill>
+        <p:spPr>
+          <a:xfrm>
+            <a:off x="0" y="2143436"/>
+            <a:ext cx="6511884" cy="6511884"/>
+          </a:xfrm>
+          <a:prstGeom prst="rect">
+            <a:avLst/>
+          </a:prstGeom>
+        </p:spPr>
+      </p:pic>
+      <p:sp>
+        <p:nvSpPr>
+          <p:cNvPr id="31" name="Slide Number Placeholder 30">
+            <a:extLst>
+              <a:ext uri="{FF2B5EF4-FFF2-40B4-BE49-F238E27FC236}">
+                <a16:creationId xmlns:a16="http://schemas.microsoft.com/office/drawing/2014/main" id="{4B1988FE-E66C-024F-90E3-2BEDDB78EC11}"/>
               </a:ext>
             </a:extLst>
           </p:cNvPr>
@@ -17957,10 +18260,10 @@
       </p:sp>
       <p:sp>
         <p:nvSpPr>
-          <p:cNvPr id="8" name="Footer Placeholder 7">
+          <p:cNvPr id="32" name="Footer Placeholder 31">
             <a:extLst>
               <a:ext uri="{FF2B5EF4-FFF2-40B4-BE49-F238E27FC236}">
-                <a16:creationId xmlns:a16="http://schemas.microsoft.com/office/drawing/2014/main" id="{8F4850EF-3532-CD49-B997-A17BAB434D51}"/>
+                <a16:creationId xmlns:a16="http://schemas.microsoft.com/office/drawing/2014/main" id="{D89C7E2B-21AF-4F42-AB76-00E7E4D31AC3}"/>
               </a:ext>
             </a:extLst>
           </p:cNvPr>
@@ -17987,7 +18290,7 @@
     </p:spTree>
     <p:extLst>
       <p:ext uri="{BB962C8B-B14F-4D97-AF65-F5344CB8AC3E}">
-        <p14:creationId xmlns:p14="http://schemas.microsoft.com/office/powerpoint/2010/main" val="8144270"/>
+        <p14:creationId xmlns:p14="http://schemas.microsoft.com/office/powerpoint/2010/main" val="3440826650"/>
       </p:ext>
     </p:extLst>
   </p:cSld>
@@ -18061,18 +18364,10 @@
           <a:lstStyle/>
           <a:p>
             <a:r>
-              <a:rPr lang="ja" altLang="en-US" sz="4200" dirty="0">
-                <a:solidFill>
-                  <a:schemeClr val="accent1"/>
-                </a:solidFill>
-              </a:rPr>
+              <a:rPr lang="ja" altLang="en-US" sz="4200" dirty="0"/>
               <a:t>自己紹介</a:t>
             </a:r>
-            <a:endParaRPr lang="en-US" altLang="ja" sz="4200" dirty="0">
-              <a:solidFill>
-                <a:schemeClr val="accent1"/>
-              </a:solidFill>
-            </a:endParaRPr>
+            <a:endParaRPr lang="en-US" altLang="ja" sz="4200" dirty="0"/>
           </a:p>
           <a:p>
             <a:r>
@@ -18121,7 +18416,7 @@
           <p:cNvPr id="4" name="Slide Number Placeholder 3">
             <a:extLst>
               <a:ext uri="{FF2B5EF4-FFF2-40B4-BE49-F238E27FC236}">
-                <a16:creationId xmlns:a16="http://schemas.microsoft.com/office/drawing/2014/main" id="{D40EB0AC-24F2-064F-9D7F-06C75FE03B43}"/>
+                <a16:creationId xmlns:a16="http://schemas.microsoft.com/office/drawing/2014/main" id="{245B8BF2-989B-F944-AA36-2C3B20207F75}"/>
               </a:ext>
             </a:extLst>
           </p:cNvPr>
@@ -18148,10 +18443,10 @@
       </p:sp>
       <p:sp>
         <p:nvSpPr>
-          <p:cNvPr id="7" name="Footer Placeholder 6">
+          <p:cNvPr id="8" name="Footer Placeholder 7">
             <a:extLst>
               <a:ext uri="{FF2B5EF4-FFF2-40B4-BE49-F238E27FC236}">
-                <a16:creationId xmlns:a16="http://schemas.microsoft.com/office/drawing/2014/main" id="{8AFFA6CF-86CF-8F46-B696-09D69815B0C4}"/>
+                <a16:creationId xmlns:a16="http://schemas.microsoft.com/office/drawing/2014/main" id="{8F4850EF-3532-CD49-B997-A17BAB434D51}"/>
               </a:ext>
             </a:extLst>
           </p:cNvPr>
@@ -18178,7 +18473,7 @@
     </p:spTree>
     <p:extLst>
       <p:ext uri="{BB962C8B-B14F-4D97-AF65-F5344CB8AC3E}">
-        <p14:creationId xmlns:p14="http://schemas.microsoft.com/office/powerpoint/2010/main" val="1702842519"/>
+        <p14:creationId xmlns:p14="http://schemas.microsoft.com/office/powerpoint/2010/main" val="8144270"/>
       </p:ext>
     </p:extLst>
   </p:cSld>
@@ -18207,6 +18502,197 @@
       </p:grpSpPr>
       <p:sp>
         <p:nvSpPr>
+          <p:cNvPr id="5" name="タイトル 4"/>
+          <p:cNvSpPr>
+            <a:spLocks noGrp="1"/>
+          </p:cNvSpPr>
+          <p:nvPr>
+            <p:ph type="title"/>
+          </p:nvPr>
+        </p:nvSpPr>
+        <p:spPr/>
+        <p:txBody>
+          <a:bodyPr>
+            <a:normAutofit/>
+          </a:bodyPr>
+          <a:lstStyle/>
+          <a:p>
+            <a:r>
+              <a:rPr kumimoji="1" lang="ja-JP" altLang="en-US" sz="6600" dirty="0"/>
+              <a:t>コンテンツ</a:t>
+            </a:r>
+          </a:p>
+        </p:txBody>
+      </p:sp>
+      <p:sp>
+        <p:nvSpPr>
+          <p:cNvPr id="6" name="テキスト プレースホルダー 5"/>
+          <p:cNvSpPr>
+            <a:spLocks noGrp="1"/>
+          </p:cNvSpPr>
+          <p:nvPr>
+            <p:ph type="body" sz="quarter" idx="12"/>
+          </p:nvPr>
+        </p:nvSpPr>
+        <p:spPr>
+          <a:xfrm>
+            <a:off x="7709647" y="1783556"/>
+            <a:ext cx="10578353" cy="6718300"/>
+          </a:xfrm>
+        </p:spPr>
+        <p:txBody>
+          <a:bodyPr>
+            <a:normAutofit/>
+          </a:bodyPr>
+          <a:lstStyle/>
+          <a:p>
+            <a:r>
+              <a:rPr lang="ja" altLang="en-US" sz="4200" dirty="0">
+                <a:solidFill>
+                  <a:schemeClr val="accent1"/>
+                </a:solidFill>
+              </a:rPr>
+              <a:t>自己紹介</a:t>
+            </a:r>
+            <a:endParaRPr lang="en-US" altLang="ja" sz="4200" dirty="0">
+              <a:solidFill>
+                <a:schemeClr val="accent1"/>
+              </a:solidFill>
+            </a:endParaRPr>
+          </a:p>
+          <a:p>
+            <a:r>
+              <a:rPr lang="ja-JP" altLang="en-US" sz="4200"/>
+              <a:t>データ</a:t>
+            </a:r>
+            <a:r>
+              <a:rPr lang="ja" altLang="en-US" sz="4200" dirty="0"/>
+              <a:t>アントレプレナーフェロープログラム</a:t>
+            </a:r>
+            <a:endParaRPr lang="en-US" altLang="ja-JP" sz="4200" dirty="0"/>
+          </a:p>
+          <a:p>
+            <a:r>
+              <a:rPr kumimoji="1" lang="ja" altLang="en-US" sz="4200" dirty="0"/>
+              <a:t>データアントレプレナー</a:t>
+            </a:r>
+            <a:r>
+              <a:rPr kumimoji="1" lang="ja-JP" altLang="en-US" sz="4200"/>
+              <a:t>実践論</a:t>
+            </a:r>
+            <a:endParaRPr kumimoji="1" lang="en-US" altLang="ja-JP" sz="4200" dirty="0"/>
+          </a:p>
+          <a:p>
+            <a:r>
+              <a:rPr kumimoji="1" lang="ja" altLang="en-US" sz="4200" dirty="0"/>
+              <a:t>データサイエンティスト</a:t>
+            </a:r>
+            <a:r>
+              <a:rPr kumimoji="1" lang="ja-JP" altLang="en-US" sz="4200"/>
+              <a:t>特論</a:t>
+            </a:r>
+            <a:endParaRPr kumimoji="1" lang="en-US" altLang="ja-JP" sz="4200" dirty="0"/>
+          </a:p>
+          <a:p>
+            <a:r>
+              <a:rPr lang="ja-JP" altLang="en-US" sz="4400"/>
+              <a:t>データ分析の目的、必要性</a:t>
+            </a:r>
+            <a:endParaRPr kumimoji="1" lang="en-US" altLang="ja-JP" sz="4200" dirty="0"/>
+          </a:p>
+        </p:txBody>
+      </p:sp>
+      <p:sp>
+        <p:nvSpPr>
+          <p:cNvPr id="4" name="Slide Number Placeholder 3">
+            <a:extLst>
+              <a:ext uri="{FF2B5EF4-FFF2-40B4-BE49-F238E27FC236}">
+                <a16:creationId xmlns:a16="http://schemas.microsoft.com/office/drawing/2014/main" id="{D40EB0AC-24F2-064F-9D7F-06C75FE03B43}"/>
+              </a:ext>
+            </a:extLst>
+          </p:cNvPr>
+          <p:cNvSpPr>
+            <a:spLocks noGrp="1"/>
+          </p:cNvSpPr>
+          <p:nvPr>
+            <p:ph type="sldNum" sz="quarter" idx="10"/>
+          </p:nvPr>
+        </p:nvSpPr>
+        <p:spPr/>
+        <p:txBody>
+          <a:bodyPr/>
+          <a:lstStyle/>
+          <a:p>
+            <a:fld id="{D28C7C6D-0F52-4FBA-8358-35C6083C2133}" type="slidenum">
+              <a:rPr kumimoji="1" lang="ja-JP" altLang="en-US" smtClean="0"/>
+              <a:pPr/>
+              <a:t>5</a:t>
+            </a:fld>
+            <a:endParaRPr kumimoji="1" lang="ja-JP" altLang="en-US"/>
+          </a:p>
+        </p:txBody>
+      </p:sp>
+      <p:sp>
+        <p:nvSpPr>
+          <p:cNvPr id="7" name="Footer Placeholder 6">
+            <a:extLst>
+              <a:ext uri="{FF2B5EF4-FFF2-40B4-BE49-F238E27FC236}">
+                <a16:creationId xmlns:a16="http://schemas.microsoft.com/office/drawing/2014/main" id="{8AFFA6CF-86CF-8F46-B696-09D69815B0C4}"/>
+              </a:ext>
+            </a:extLst>
+          </p:cNvPr>
+          <p:cNvSpPr>
+            <a:spLocks noGrp="1"/>
+          </p:cNvSpPr>
+          <p:nvPr>
+            <p:ph type="ftr" sz="quarter" idx="11"/>
+          </p:nvPr>
+        </p:nvSpPr>
+        <p:spPr/>
+        <p:txBody>
+          <a:bodyPr/>
+          <a:lstStyle/>
+          <a:p>
+            <a:r>
+              <a:rPr kumimoji="1" lang="en-US" altLang="ja-JP"/>
+              <a:t>@Takato Matsumoto, 2020</a:t>
+            </a:r>
+            <a:endParaRPr kumimoji="1" lang="ja-JP" altLang="en-US" dirty="0"/>
+          </a:p>
+        </p:txBody>
+      </p:sp>
+    </p:spTree>
+    <p:extLst>
+      <p:ext uri="{BB962C8B-B14F-4D97-AF65-F5344CB8AC3E}">
+        <p14:creationId xmlns:p14="http://schemas.microsoft.com/office/powerpoint/2010/main" val="1702842519"/>
+      </p:ext>
+    </p:extLst>
+  </p:cSld>
+  <p:clrMapOvr>
+    <a:masterClrMapping/>
+  </p:clrMapOvr>
+</p:sld>
+</file>
+
+<file path=ppt/slides/slide6.xml><?xml version="1.0" encoding="utf-8"?>
+<p:sld xmlns:a="http://schemas.openxmlformats.org/drawingml/2006/main" xmlns:r="http://schemas.openxmlformats.org/officeDocument/2006/relationships" xmlns:p="http://schemas.openxmlformats.org/presentationml/2006/main">
+  <p:cSld>
+    <p:spTree>
+      <p:nvGrpSpPr>
+        <p:cNvPr id="1" name=""/>
+        <p:cNvGrpSpPr/>
+        <p:nvPr/>
+      </p:nvGrpSpPr>
+      <p:grpSpPr>
+        <a:xfrm>
+          <a:off x="0" y="0"/>
+          <a:ext cx="0" cy="0"/>
+          <a:chOff x="0" y="0"/>
+          <a:chExt cx="0" cy="0"/>
+        </a:xfrm>
+      </p:grpSpPr>
+      <p:sp>
+        <p:nvSpPr>
           <p:cNvPr id="6" name="タイトル 5"/>
           <p:cNvSpPr>
             <a:spLocks noGrp="1"/>
@@ -18264,7 +18750,7 @@
             <a:fld id="{D28C7C6D-0F52-4FBA-8358-35C6083C2133}" type="slidenum">
               <a:rPr kumimoji="1" lang="ja-JP" altLang="en-US" smtClean="0"/>
               <a:pPr/>
-              <a:t>5</a:t>
+              <a:t>6</a:t>
             </a:fld>
             <a:endParaRPr kumimoji="1" lang="ja-JP" altLang="en-US"/>
           </a:p>
@@ -18488,7 +18974,7 @@
 </p:sld>
 </file>
 
-<file path=ppt/slides/slide6.xml><?xml version="1.0" encoding="utf-8"?>
+<file path=ppt/slides/slide7.xml><?xml version="1.0" encoding="utf-8"?>
 <p:sld xmlns:a="http://schemas.openxmlformats.org/drawingml/2006/main" xmlns:r="http://schemas.openxmlformats.org/officeDocument/2006/relationships" xmlns:p="http://schemas.openxmlformats.org/presentationml/2006/main">
   <p:cSld>
     <p:spTree>
@@ -18846,7 +19332,7 @@
             <a:fld id="{D28C7C6D-0F52-4FBA-8358-35C6083C2133}" type="slidenum">
               <a:rPr kumimoji="1" lang="ja-JP" altLang="en-US" smtClean="0"/>
               <a:pPr/>
-              <a:t>6</a:t>
+              <a:t>7</a:t>
             </a:fld>
             <a:endParaRPr kumimoji="1" lang="ja-JP" altLang="en-US"/>
           </a:p>
@@ -18885,201 +19371,6 @@
     <p:extLst>
       <p:ext uri="{BB962C8B-B14F-4D97-AF65-F5344CB8AC3E}">
         <p14:creationId xmlns:p14="http://schemas.microsoft.com/office/powerpoint/2010/main" val="3535425263"/>
-      </p:ext>
-    </p:extLst>
-  </p:cSld>
-  <p:clrMapOvr>
-    <a:masterClrMapping/>
-  </p:clrMapOvr>
-</p:sld>
-</file>
-
-<file path=ppt/slides/slide7.xml><?xml version="1.0" encoding="utf-8"?>
-<p:sld xmlns:a="http://schemas.openxmlformats.org/drawingml/2006/main" xmlns:r="http://schemas.openxmlformats.org/officeDocument/2006/relationships" xmlns:p="http://schemas.openxmlformats.org/presentationml/2006/main">
-  <p:cSld>
-    <p:spTree>
-      <p:nvGrpSpPr>
-        <p:cNvPr id="1" name=""/>
-        <p:cNvGrpSpPr/>
-        <p:nvPr/>
-      </p:nvGrpSpPr>
-      <p:grpSpPr>
-        <a:xfrm>
-          <a:off x="0" y="0"/>
-          <a:ext cx="0" cy="0"/>
-          <a:chOff x="0" y="0"/>
-          <a:chExt cx="0" cy="0"/>
-        </a:xfrm>
-      </p:grpSpPr>
-      <p:sp>
-        <p:nvSpPr>
-          <p:cNvPr id="5" name="タイトル 4"/>
-          <p:cNvSpPr>
-            <a:spLocks noGrp="1"/>
-          </p:cNvSpPr>
-          <p:nvPr>
-            <p:ph type="title"/>
-          </p:nvPr>
-        </p:nvSpPr>
-        <p:spPr/>
-        <p:txBody>
-          <a:bodyPr>
-            <a:normAutofit/>
-          </a:bodyPr>
-          <a:lstStyle/>
-          <a:p>
-            <a:r>
-              <a:rPr kumimoji="1" lang="ja-JP" altLang="en-US" sz="6600" dirty="0"/>
-              <a:t>コンテンツ</a:t>
-            </a:r>
-          </a:p>
-        </p:txBody>
-      </p:sp>
-      <p:sp>
-        <p:nvSpPr>
-          <p:cNvPr id="6" name="テキスト プレースホルダー 5"/>
-          <p:cNvSpPr>
-            <a:spLocks noGrp="1"/>
-          </p:cNvSpPr>
-          <p:nvPr>
-            <p:ph type="body" sz="quarter" idx="12"/>
-          </p:nvPr>
-        </p:nvSpPr>
-        <p:spPr>
-          <a:xfrm>
-            <a:off x="7709647" y="1783556"/>
-            <a:ext cx="10578353" cy="6718300"/>
-          </a:xfrm>
-        </p:spPr>
-        <p:txBody>
-          <a:bodyPr>
-            <a:normAutofit/>
-          </a:bodyPr>
-          <a:lstStyle/>
-          <a:p>
-            <a:r>
-              <a:rPr lang="ja" altLang="en-US" sz="4200" dirty="0"/>
-              <a:t>自己紹介</a:t>
-            </a:r>
-            <a:endParaRPr lang="en-US" altLang="ja" sz="4200" dirty="0"/>
-          </a:p>
-          <a:p>
-            <a:r>
-              <a:rPr lang="ja-JP" altLang="en-US" sz="4200">
-                <a:solidFill>
-                  <a:schemeClr val="accent1"/>
-                </a:solidFill>
-              </a:rPr>
-              <a:t>データ</a:t>
-            </a:r>
-            <a:r>
-              <a:rPr lang="ja" altLang="en-US" sz="4200" dirty="0">
-                <a:solidFill>
-                  <a:schemeClr val="accent1"/>
-                </a:solidFill>
-              </a:rPr>
-              <a:t>アントレプレナーフェロープログラム</a:t>
-            </a:r>
-            <a:endParaRPr lang="en-US" altLang="ja-JP" sz="4200" dirty="0">
-              <a:solidFill>
-                <a:schemeClr val="accent1"/>
-              </a:solidFill>
-            </a:endParaRPr>
-          </a:p>
-          <a:p>
-            <a:r>
-              <a:rPr kumimoji="1" lang="ja" altLang="en-US" sz="4200" dirty="0"/>
-              <a:t>データアントレプレナー</a:t>
-            </a:r>
-            <a:r>
-              <a:rPr kumimoji="1" lang="ja-JP" altLang="en-US" sz="4200"/>
-              <a:t>実践論</a:t>
-            </a:r>
-            <a:endParaRPr kumimoji="1" lang="en-US" altLang="ja-JP" sz="4200" dirty="0"/>
-          </a:p>
-          <a:p>
-            <a:r>
-              <a:rPr kumimoji="1" lang="ja" altLang="en-US" sz="4200" dirty="0"/>
-              <a:t>データサイエンティスト</a:t>
-            </a:r>
-            <a:r>
-              <a:rPr kumimoji="1" lang="ja-JP" altLang="en-US" sz="4200"/>
-              <a:t>特論</a:t>
-            </a:r>
-            <a:endParaRPr kumimoji="1" lang="en-US" altLang="ja-JP" sz="4200" dirty="0"/>
-          </a:p>
-          <a:p>
-            <a:r>
-              <a:rPr lang="ja-JP" altLang="en-US" sz="4400"/>
-              <a:t>データ分析の目的、必要性</a:t>
-            </a:r>
-            <a:endParaRPr lang="en-US" altLang="ja-JP" sz="4200" dirty="0"/>
-          </a:p>
-        </p:txBody>
-      </p:sp>
-      <p:sp>
-        <p:nvSpPr>
-          <p:cNvPr id="4" name="Slide Number Placeholder 3">
-            <a:extLst>
-              <a:ext uri="{FF2B5EF4-FFF2-40B4-BE49-F238E27FC236}">
-                <a16:creationId xmlns:a16="http://schemas.microsoft.com/office/drawing/2014/main" id="{D3E7FA87-2E39-7E4B-BE93-51F96F69162C}"/>
-              </a:ext>
-            </a:extLst>
-          </p:cNvPr>
-          <p:cNvSpPr>
-            <a:spLocks noGrp="1"/>
-          </p:cNvSpPr>
-          <p:nvPr>
-            <p:ph type="sldNum" sz="quarter" idx="10"/>
-          </p:nvPr>
-        </p:nvSpPr>
-        <p:spPr/>
-        <p:txBody>
-          <a:bodyPr/>
-          <a:lstStyle/>
-          <a:p>
-            <a:fld id="{D28C7C6D-0F52-4FBA-8358-35C6083C2133}" type="slidenum">
-              <a:rPr kumimoji="1" lang="ja-JP" altLang="en-US" smtClean="0"/>
-              <a:pPr/>
-              <a:t>7</a:t>
-            </a:fld>
-            <a:endParaRPr kumimoji="1" lang="ja-JP" altLang="en-US"/>
-          </a:p>
-        </p:txBody>
-      </p:sp>
-      <p:sp>
-        <p:nvSpPr>
-          <p:cNvPr id="7" name="Footer Placeholder 6">
-            <a:extLst>
-              <a:ext uri="{FF2B5EF4-FFF2-40B4-BE49-F238E27FC236}">
-                <a16:creationId xmlns:a16="http://schemas.microsoft.com/office/drawing/2014/main" id="{7B594C3E-0428-FD47-ABEC-E437828D8759}"/>
-              </a:ext>
-            </a:extLst>
-          </p:cNvPr>
-          <p:cNvSpPr>
-            <a:spLocks noGrp="1"/>
-          </p:cNvSpPr>
-          <p:nvPr>
-            <p:ph type="ftr" sz="quarter" idx="11"/>
-          </p:nvPr>
-        </p:nvSpPr>
-        <p:spPr/>
-        <p:txBody>
-          <a:bodyPr/>
-          <a:lstStyle/>
-          <a:p>
-            <a:r>
-              <a:rPr kumimoji="1" lang="en-US" altLang="ja-JP"/>
-              <a:t>@Takato Matsumoto, 2020</a:t>
-            </a:r>
-            <a:endParaRPr kumimoji="1" lang="ja-JP" altLang="en-US" dirty="0"/>
-          </a:p>
-        </p:txBody>
-      </p:sp>
-    </p:spTree>
-    <p:extLst>
-      <p:ext uri="{BB962C8B-B14F-4D97-AF65-F5344CB8AC3E}">
-        <p14:creationId xmlns:p14="http://schemas.microsoft.com/office/powerpoint/2010/main" val="2284241854"/>
       </p:ext>
     </p:extLst>
   </p:cSld>
@@ -19108,158 +19399,119 @@
       </p:grpSpPr>
       <p:sp>
         <p:nvSpPr>
-          <p:cNvPr id="7" name="テキスト プレースホルダー 6"/>
-          <p:cNvSpPr>
-            <a:spLocks noGrp="1"/>
-          </p:cNvSpPr>
-          <p:nvPr>
-            <p:ph type="body" sz="quarter" idx="14"/>
-          </p:nvPr>
-        </p:nvSpPr>
-        <p:spPr>
-          <a:xfrm>
-            <a:off x="9340948" y="1856206"/>
-            <a:ext cx="8054746" cy="3142846"/>
-          </a:xfrm>
-        </p:spPr>
-        <p:txBody>
-          <a:bodyPr/>
-          <a:lstStyle/>
-          <a:p>
-            <a:r>
-              <a:rPr lang="ja" altLang="en-US" sz="5400" dirty="0"/>
-              <a:t>データアントレプレナー</a:t>
-            </a:r>
-            <a:endParaRPr lang="en-US" altLang="ja" sz="5400" dirty="0"/>
-          </a:p>
-          <a:p>
-            <a:r>
-              <a:rPr lang="ja" altLang="en-US" sz="5400" dirty="0"/>
-              <a:t>フェロープログラム</a:t>
-            </a:r>
-            <a:endParaRPr lang="ja-JP" altLang="en-US" sz="5400" dirty="0"/>
-          </a:p>
-        </p:txBody>
-      </p:sp>
-      <p:sp>
-        <p:nvSpPr>
-          <p:cNvPr id="8" name="テキスト プレースホルダー 7"/>
-          <p:cNvSpPr>
-            <a:spLocks noGrp="1"/>
-          </p:cNvSpPr>
-          <p:nvPr>
-            <p:ph type="body" sz="quarter" idx="15"/>
-          </p:nvPr>
-        </p:nvSpPr>
-        <p:spPr>
-          <a:xfrm>
-            <a:off x="9340948" y="5266345"/>
-            <a:ext cx="8054746" cy="3807314"/>
-          </a:xfrm>
-        </p:spPr>
+          <p:cNvPr id="5" name="タイトル 4"/>
+          <p:cNvSpPr>
+            <a:spLocks noGrp="1"/>
+          </p:cNvSpPr>
+          <p:nvPr>
+            <p:ph type="title"/>
+          </p:nvPr>
+        </p:nvSpPr>
+        <p:spPr/>
         <p:txBody>
           <a:bodyPr>
-            <a:normAutofit fontScale="92500"/>
+            <a:normAutofit/>
           </a:bodyPr>
           <a:lstStyle/>
           <a:p>
             <a:r>
-              <a:rPr lang="ja-JP" altLang="en-US" sz="4000"/>
+              <a:rPr kumimoji="1" lang="ja-JP" altLang="en-US" sz="6600" dirty="0"/>
+              <a:t>コンテンツ</a:t>
+            </a:r>
+          </a:p>
+        </p:txBody>
+      </p:sp>
+      <p:sp>
+        <p:nvSpPr>
+          <p:cNvPr id="6" name="テキスト プレースホルダー 5"/>
+          <p:cNvSpPr>
+            <a:spLocks noGrp="1"/>
+          </p:cNvSpPr>
+          <p:nvPr>
+            <p:ph type="body" sz="quarter" idx="12"/>
+          </p:nvPr>
+        </p:nvSpPr>
+        <p:spPr>
+          <a:xfrm>
+            <a:off x="7709647" y="1783556"/>
+            <a:ext cx="10578353" cy="6718300"/>
+          </a:xfrm>
+        </p:spPr>
+        <p:txBody>
+          <a:bodyPr>
+            <a:normAutofit/>
+          </a:bodyPr>
+          <a:lstStyle/>
+          <a:p>
+            <a:r>
+              <a:rPr lang="ja" altLang="en-US" sz="4200" dirty="0"/>
+              <a:t>自己紹介</a:t>
+            </a:r>
+            <a:endParaRPr lang="en-US" altLang="ja" sz="4200" dirty="0"/>
+          </a:p>
+          <a:p>
+            <a:r>
+              <a:rPr lang="ja-JP" altLang="en-US" sz="4200">
+                <a:solidFill>
+                  <a:schemeClr val="accent1"/>
+                </a:solidFill>
+              </a:rPr>
               <a:t>データ</a:t>
             </a:r>
             <a:r>
-              <a:rPr lang="ja" altLang="en-US" sz="4000" dirty="0"/>
-              <a:t>人材育成プログラム</a:t>
-            </a:r>
-            <a:endParaRPr lang="en-US" altLang="ja" sz="4000" dirty="0"/>
-          </a:p>
-          <a:p>
-            <a:pPr lvl="1"/>
-            <a:r>
-              <a:rPr lang="ja-JP" altLang="en-US" sz="3600"/>
-              <a:t>電通大で</a:t>
-            </a:r>
-            <a:r>
-              <a:rPr lang="ja" altLang="en-US" sz="3600" dirty="0"/>
-              <a:t>開催されて</a:t>
-            </a:r>
-            <a:r>
-              <a:rPr lang="ja-JP" altLang="en-US" sz="3600"/>
-              <a:t>いる</a:t>
-            </a:r>
-            <a:endParaRPr lang="en-US" altLang="ja-JP" sz="3600" dirty="0"/>
-          </a:p>
-          <a:p>
-            <a:r>
-              <a:rPr lang="ja-JP" altLang="en-US" sz="4000"/>
-              <a:t>学べること</a:t>
-            </a:r>
-            <a:endParaRPr lang="en-US" altLang="ja-JP" sz="4000" dirty="0"/>
-          </a:p>
-          <a:p>
-            <a:pPr lvl="1"/>
-            <a:r>
-              <a:rPr lang="ja-JP" altLang="en-US" sz="3600"/>
-              <a:t>データを活用した</a:t>
-            </a:r>
-            <a:r>
-              <a:rPr lang="ja" altLang="en-US" sz="3600" dirty="0"/>
-              <a:t>ビジネス</a:t>
-            </a:r>
-            <a:r>
-              <a:rPr lang="ja-JP" altLang="en-US" sz="3600"/>
-              <a:t>理論</a:t>
-            </a:r>
-            <a:r>
-              <a:rPr lang="ja" altLang="en-US" sz="3600" dirty="0"/>
-              <a:t>，</a:t>
-            </a:r>
-            <a:r>
-              <a:rPr lang="ja-JP" altLang="en-US" sz="3600"/>
-              <a:t>政策</a:t>
-            </a:r>
-            <a:endParaRPr lang="en-US" altLang="ja-JP" sz="3600" dirty="0"/>
-          </a:p>
-          <a:p>
-            <a:pPr lvl="1"/>
-            <a:r>
-              <a:rPr lang="ja" altLang="en-US" sz="3600" dirty="0"/>
-              <a:t>データ</a:t>
-            </a:r>
-            <a:r>
-              <a:rPr lang="ja-JP" altLang="en-US" sz="3600"/>
-              <a:t>分析手法，実装技術など</a:t>
-            </a:r>
-            <a:endParaRPr lang="en-US" altLang="ja-JP" sz="5400" dirty="0"/>
-          </a:p>
-        </p:txBody>
-      </p:sp>
-      <p:sp>
-        <p:nvSpPr>
-          <p:cNvPr id="10" name="フッター プレースホルダー 9"/>
-          <p:cNvSpPr>
-            <a:spLocks noGrp="1"/>
-          </p:cNvSpPr>
-          <p:nvPr>
-            <p:ph type="ftr" sz="quarter" idx="11"/>
-          </p:nvPr>
-        </p:nvSpPr>
-        <p:spPr/>
-        <p:txBody>
-          <a:bodyPr/>
-          <a:lstStyle/>
-          <a:p>
-            <a:r>
-              <a:rPr kumimoji="1" lang="en-US" altLang="ja-JP"/>
-              <a:t>@Takato Matsumoto, 2020</a:t>
-            </a:r>
-            <a:endParaRPr kumimoji="1" lang="ja-JP" altLang="en-US" dirty="0"/>
-          </a:p>
-        </p:txBody>
-      </p:sp>
-      <p:sp>
-        <p:nvSpPr>
-          <p:cNvPr id="11" name="スライド番号プレースホルダー 10"/>
+              <a:rPr lang="ja" altLang="en-US" sz="4200" dirty="0">
+                <a:solidFill>
+                  <a:schemeClr val="accent1"/>
+                </a:solidFill>
+              </a:rPr>
+              <a:t>アントレプレナーフェロープログラム</a:t>
+            </a:r>
+            <a:endParaRPr lang="en-US" altLang="ja-JP" sz="4200" dirty="0">
+              <a:solidFill>
+                <a:schemeClr val="accent1"/>
+              </a:solidFill>
+            </a:endParaRPr>
+          </a:p>
+          <a:p>
+            <a:r>
+              <a:rPr kumimoji="1" lang="ja" altLang="en-US" sz="4200" dirty="0"/>
+              <a:t>データアントレプレナー</a:t>
+            </a:r>
+            <a:r>
+              <a:rPr kumimoji="1" lang="ja-JP" altLang="en-US" sz="4200"/>
+              <a:t>実践論</a:t>
+            </a:r>
+            <a:endParaRPr kumimoji="1" lang="en-US" altLang="ja-JP" sz="4200" dirty="0"/>
+          </a:p>
+          <a:p>
+            <a:r>
+              <a:rPr kumimoji="1" lang="ja" altLang="en-US" sz="4200" dirty="0"/>
+              <a:t>データサイエンティスト</a:t>
+            </a:r>
+            <a:r>
+              <a:rPr kumimoji="1" lang="ja-JP" altLang="en-US" sz="4200"/>
+              <a:t>特論</a:t>
+            </a:r>
+            <a:endParaRPr kumimoji="1" lang="en-US" altLang="ja-JP" sz="4200" dirty="0"/>
+          </a:p>
+          <a:p>
+            <a:r>
+              <a:rPr lang="ja-JP" altLang="en-US" sz="4400"/>
+              <a:t>データ分析の目的、必要性</a:t>
+            </a:r>
+            <a:endParaRPr lang="en-US" altLang="ja-JP" sz="4200" dirty="0"/>
+          </a:p>
+        </p:txBody>
+      </p:sp>
+      <p:sp>
+        <p:nvSpPr>
+          <p:cNvPr id="4" name="Slide Number Placeholder 3">
+            <a:extLst>
+              <a:ext uri="{FF2B5EF4-FFF2-40B4-BE49-F238E27FC236}">
+                <a16:creationId xmlns:a16="http://schemas.microsoft.com/office/drawing/2014/main" id="{D3E7FA87-2E39-7E4B-BE93-51F96F69162C}"/>
+              </a:ext>
+            </a:extLst>
+          </p:cNvPr>
           <p:cNvSpPr>
             <a:spLocks noGrp="1"/>
           </p:cNvSpPr>
@@ -19281,82 +19533,39 @@
           </a:p>
         </p:txBody>
       </p:sp>
-      <p:pic>
-        <p:nvPicPr>
-          <p:cNvPr id="16" name="Picture Placeholder 15">
+      <p:sp>
+        <p:nvSpPr>
+          <p:cNvPr id="7" name="Footer Placeholder 6">
             <a:extLst>
               <a:ext uri="{FF2B5EF4-FFF2-40B4-BE49-F238E27FC236}">
-                <a16:creationId xmlns:a16="http://schemas.microsoft.com/office/drawing/2014/main" id="{35C36191-2700-784D-8C53-5588D4E73F5B}"/>
+                <a16:creationId xmlns:a16="http://schemas.microsoft.com/office/drawing/2014/main" id="{7B594C3E-0428-FD47-ABEC-E437828D8759}"/>
               </a:ext>
             </a:extLst>
           </p:cNvPr>
-          <p:cNvPicPr>
-            <a:picLocks noGrp="1" noChangeAspect="1"/>
-          </p:cNvPicPr>
-          <p:nvPr>
-            <p:ph type="pic" sz="quarter" idx="12"/>
-          </p:nvPr>
-        </p:nvPicPr>
-        <p:blipFill rotWithShape="1">
-          <a:blip r:embed="rId2">
-            <a:extLst>
-              <a:ext uri="{28A0092B-C50C-407E-A947-70E740481C1C}">
-                <a14:useLocalDpi xmlns:a14="http://schemas.microsoft.com/office/drawing/2010/main" val="0"/>
-              </a:ext>
-            </a:extLst>
-          </a:blip>
-          <a:srcRect b="11548"/>
-          <a:stretch/>
-        </p:blipFill>
-        <p:spPr>
-          <a:xfrm>
-            <a:off x="0" y="0"/>
-            <a:ext cx="8197850" cy="10285413"/>
-          </a:xfrm>
-        </p:spPr>
-      </p:pic>
-      <p:sp>
-        <p:nvSpPr>
-          <p:cNvPr id="17" name="TextBox 16">
-            <a:extLst>
-              <a:ext uri="{FF2B5EF4-FFF2-40B4-BE49-F238E27FC236}">
-                <a16:creationId xmlns:a16="http://schemas.microsoft.com/office/drawing/2014/main" id="{28724D3E-BBA8-2148-B7C2-1475F22CA339}"/>
-              </a:ext>
-            </a:extLst>
-          </p:cNvPr>
-          <p:cNvSpPr txBox="1"/>
-          <p:nvPr/>
-        </p:nvSpPr>
-        <p:spPr>
-          <a:xfrm>
-            <a:off x="15959670" y="0"/>
-            <a:ext cx="2328330" cy="369332"/>
-          </a:xfrm>
-          <a:prstGeom prst="rect">
-            <a:avLst/>
-          </a:prstGeom>
-          <a:noFill/>
-        </p:spPr>
-        <p:txBody>
-          <a:bodyPr wrap="none" rtlCol="0">
-            <a:spAutoFit/>
-          </a:bodyPr>
+          <p:cNvSpPr>
+            <a:spLocks noGrp="1"/>
+          </p:cNvSpPr>
+          <p:nvPr>
+            <p:ph type="ftr" sz="quarter" idx="11"/>
+          </p:nvPr>
+        </p:nvSpPr>
+        <p:spPr/>
+        <p:txBody>
+          <a:bodyPr/>
           <a:lstStyle/>
           <a:p>
             <a:r>
-              <a:rPr lang="en-US" dirty="0">
-                <a:hlinkClick r:id="rId3"/>
-              </a:rPr>
-              <a:t>https://de.uec.ac.jp/</a:t>
-            </a:r>
-            <a:endParaRPr lang="en-US" dirty="0"/>
+              <a:rPr kumimoji="1" lang="en-US" altLang="ja-JP"/>
+              <a:t>@Takato Matsumoto, 2020</a:t>
+            </a:r>
+            <a:endParaRPr kumimoji="1" lang="ja-JP" altLang="en-US" dirty="0"/>
           </a:p>
         </p:txBody>
       </p:sp>
     </p:spTree>
     <p:extLst>
       <p:ext uri="{BB962C8B-B14F-4D97-AF65-F5344CB8AC3E}">
-        <p14:creationId xmlns:p14="http://schemas.microsoft.com/office/powerpoint/2010/main" val="754355083"/>
+        <p14:creationId xmlns:p14="http://schemas.microsoft.com/office/powerpoint/2010/main" val="2284241854"/>
       </p:ext>
     </p:extLst>
   </p:cSld>
@@ -19385,181 +19594,158 @@
       </p:grpSpPr>
       <p:sp>
         <p:nvSpPr>
-          <p:cNvPr id="9" name="タイトル 8"/>
-          <p:cNvSpPr>
-            <a:spLocks noGrp="1"/>
-          </p:cNvSpPr>
-          <p:nvPr>
-            <p:ph type="title"/>
-          </p:nvPr>
-        </p:nvSpPr>
-        <p:spPr/>
+          <p:cNvPr id="7" name="テキスト プレースホルダー 6"/>
+          <p:cNvSpPr>
+            <a:spLocks noGrp="1"/>
+          </p:cNvSpPr>
+          <p:nvPr>
+            <p:ph type="body" sz="quarter" idx="14"/>
+          </p:nvPr>
+        </p:nvSpPr>
+        <p:spPr>
+          <a:xfrm>
+            <a:off x="9340948" y="1856206"/>
+            <a:ext cx="8054746" cy="3142846"/>
+          </a:xfrm>
+        </p:spPr>
         <p:txBody>
           <a:bodyPr/>
           <a:lstStyle/>
           <a:p>
             <a:r>
-              <a:rPr kumimoji="1" lang="ja" altLang="en-US" dirty="0"/>
+              <a:rPr lang="ja" altLang="en-US" sz="5400" dirty="0"/>
               <a:t>データアントレプレナー</a:t>
             </a:r>
-            <a:r>
-              <a:rPr kumimoji="1" lang="ja-JP" altLang="en-US"/>
-              <a:t>フェロープログラム（</a:t>
-            </a:r>
-            <a:r>
-              <a:rPr kumimoji="1" lang="en-US" altLang="ja-JP" dirty="0" err="1"/>
-              <a:t>Defp</a:t>
-            </a:r>
-            <a:r>
-              <a:rPr kumimoji="1" lang="ja-JP" altLang="en-US"/>
-              <a:t>）</a:t>
-            </a:r>
-            <a:r>
-              <a:rPr kumimoji="1" lang="en-US" altLang="ja-JP" dirty="0"/>
-              <a:t> | </a:t>
-            </a:r>
-            <a:r>
-              <a:rPr lang="ja-JP" altLang="en-US"/>
-              <a:t>講義内容</a:t>
-            </a:r>
-            <a:endParaRPr kumimoji="1" lang="ja-JP" altLang="en-US" dirty="0"/>
-          </a:p>
-        </p:txBody>
-      </p:sp>
-      <p:sp>
-        <p:nvSpPr>
-          <p:cNvPr id="10" name="テキスト プレースホルダー 9"/>
-          <p:cNvSpPr>
-            <a:spLocks noGrp="1"/>
-          </p:cNvSpPr>
-          <p:nvPr>
-            <p:ph type="body" sz="quarter" idx="12"/>
-          </p:nvPr>
-        </p:nvSpPr>
-        <p:spPr>
-          <a:xfrm>
-            <a:off x="2670361" y="1420977"/>
-            <a:ext cx="13201277" cy="8600285"/>
+            <a:endParaRPr lang="en-US" altLang="ja" sz="5400" dirty="0"/>
+          </a:p>
+          <a:p>
+            <a:r>
+              <a:rPr lang="ja" altLang="en-US" sz="5400" dirty="0"/>
+              <a:t>フェロープログラム</a:t>
+            </a:r>
+            <a:endParaRPr lang="ja-JP" altLang="en-US" sz="5400" dirty="0"/>
+          </a:p>
+        </p:txBody>
+      </p:sp>
+      <p:sp>
+        <p:nvSpPr>
+          <p:cNvPr id="8" name="テキスト プレースホルダー 7"/>
+          <p:cNvSpPr>
+            <a:spLocks noGrp="1"/>
+          </p:cNvSpPr>
+          <p:nvPr>
+            <p:ph type="body" sz="quarter" idx="15"/>
+          </p:nvPr>
+        </p:nvSpPr>
+        <p:spPr>
+          <a:xfrm>
+            <a:off x="9340948" y="5266345"/>
+            <a:ext cx="8054746" cy="3807314"/>
           </a:xfrm>
         </p:spPr>
         <p:txBody>
           <a:bodyPr>
-            <a:normAutofit/>
+            <a:normAutofit fontScale="92500"/>
           </a:bodyPr>
           <a:lstStyle/>
           <a:p>
             <a:r>
-              <a:rPr lang="ja" altLang="en-US" sz="4400" dirty="0"/>
-              <a:t>データアントレプレナー</a:t>
-            </a:r>
-            <a:r>
-              <a:rPr lang="ja-JP" altLang="en-US" sz="4400"/>
-              <a:t>実践論</a:t>
-            </a:r>
-            <a:endParaRPr lang="en-US" altLang="ja-JP" sz="4400" dirty="0"/>
+              <a:rPr lang="ja-JP" altLang="en-US" sz="4000"/>
+              <a:t>データ</a:t>
+            </a:r>
+            <a:r>
+              <a:rPr lang="ja" altLang="en-US" sz="4000" dirty="0"/>
+              <a:t>人材育成プログラム</a:t>
+            </a:r>
+            <a:endParaRPr lang="en-US" altLang="ja" sz="4000" dirty="0"/>
           </a:p>
           <a:p>
             <a:pPr lvl="1"/>
             <a:r>
               <a:rPr lang="ja-JP" altLang="en-US" sz="3600"/>
-              <a:t>各企業が</a:t>
+              <a:t>電通大で</a:t>
             </a:r>
             <a:r>
               <a:rPr lang="ja" altLang="en-US" sz="3600" dirty="0"/>
-              <a:t>行なっている</a:t>
+              <a:t>開催されて</a:t>
             </a:r>
             <a:r>
               <a:rPr lang="ja-JP" altLang="en-US" sz="3600"/>
-              <a:t>データビジネスの実例を学ぶ</a:t>
+              <a:t>いる</a:t>
             </a:r>
             <a:endParaRPr lang="en-US" altLang="ja-JP" sz="3600" dirty="0"/>
           </a:p>
           <a:p>
+            <a:r>
+              <a:rPr lang="ja-JP" altLang="en-US" sz="4000"/>
+              <a:t>学べること</a:t>
+            </a:r>
+            <a:endParaRPr lang="en-US" altLang="ja-JP" sz="4000" dirty="0"/>
+          </a:p>
+          <a:p>
             <a:pPr lvl="1"/>
             <a:r>
               <a:rPr lang="ja-JP" altLang="en-US" sz="3600"/>
-              <a:t>最終コマで</a:t>
+              <a:t>データを活用した</a:t>
             </a:r>
             <a:r>
               <a:rPr lang="ja" altLang="en-US" sz="3600" dirty="0"/>
-              <a:t>ピッチコンテスト</a:t>
+              <a:t>ビジネス</a:t>
             </a:r>
             <a:r>
               <a:rPr lang="ja-JP" altLang="en-US" sz="3600"/>
-              <a:t>を行う</a:t>
+              <a:t>理論</a:t>
+            </a:r>
+            <a:r>
+              <a:rPr lang="ja" altLang="en-US" sz="3600" dirty="0"/>
+              <a:t>，</a:t>
+            </a:r>
+            <a:r>
+              <a:rPr lang="ja-JP" altLang="en-US" sz="3600"/>
+              <a:t>政策</a:t>
             </a:r>
             <a:endParaRPr lang="en-US" altLang="ja-JP" sz="3600" dirty="0"/>
           </a:p>
           <a:p>
-            <a:pPr lvl="2"/>
+            <a:pPr lvl="1"/>
+            <a:r>
+              <a:rPr lang="ja" altLang="en-US" sz="3600" dirty="0"/>
+              <a:t>データ</a:t>
+            </a:r>
             <a:r>
               <a:rPr lang="ja-JP" altLang="en-US" sz="3600"/>
-              <a:t>データを活用したビジネスプランを提言するコンテスト</a:t>
-            </a:r>
-            <a:endParaRPr lang="en-US" altLang="ja-JP" sz="3600" dirty="0"/>
-          </a:p>
-          <a:p>
-            <a:pPr lvl="2"/>
-            <a:endParaRPr lang="en-US" altLang="ja-JP" sz="3600" dirty="0"/>
-          </a:p>
-          <a:p>
-            <a:r>
-              <a:rPr lang="ja-JP" altLang="en-US" sz="4400"/>
-              <a:t>データサイエンティスト特論</a:t>
-            </a:r>
-            <a:endParaRPr lang="en-US" altLang="ja-JP" sz="4400" dirty="0"/>
-          </a:p>
-          <a:p>
-            <a:pPr lvl="1"/>
-            <a:r>
-              <a:rPr lang="ja" altLang="en-US" sz="3600" dirty="0"/>
-              <a:t>不動産データ</a:t>
-            </a:r>
-            <a:r>
-              <a:rPr lang="ja-JP" altLang="en-US" sz="3600"/>
-              <a:t>の分析，機械学習モデル（</a:t>
-            </a:r>
-            <a:r>
-              <a:rPr lang="en-US" altLang="ja-JP" sz="3600" dirty="0"/>
-              <a:t>AI</a:t>
-            </a:r>
-            <a:r>
-              <a:rPr lang="ja-JP" altLang="en-US" sz="3600"/>
-              <a:t>エンジン）の実装</a:t>
-            </a:r>
-            <a:endParaRPr lang="en-US" altLang="ja-JP" sz="3600" dirty="0"/>
-          </a:p>
-          <a:p>
-            <a:pPr lvl="2"/>
-            <a:r>
-              <a:rPr lang="ja-JP" altLang="en-US" sz="3600"/>
-              <a:t>物件価格</a:t>
-            </a:r>
-            <a:r>
-              <a:rPr lang="ja" altLang="en-US" sz="3600" dirty="0"/>
-              <a:t>予測モデルの</a:t>
-            </a:r>
-            <a:r>
-              <a:rPr lang="ja-JP" altLang="en-US" sz="3600"/>
-              <a:t>精度を競うコンペティションを行う</a:t>
-            </a:r>
-            <a:endParaRPr lang="en-US" altLang="ja-JP" sz="3600" dirty="0"/>
-          </a:p>
-          <a:p>
-            <a:pPr lvl="1"/>
-            <a:endParaRPr kumimoji="1" lang="en-US" altLang="ja" dirty="0"/>
-          </a:p>
-        </p:txBody>
-      </p:sp>
-      <p:sp>
-        <p:nvSpPr>
-          <p:cNvPr id="34" name="Slide Number Placeholder 33">
-            <a:extLst>
-              <a:ext uri="{FF2B5EF4-FFF2-40B4-BE49-F238E27FC236}">
-                <a16:creationId xmlns:a16="http://schemas.microsoft.com/office/drawing/2014/main" id="{9D5F9A3D-C521-1649-A724-230DE88284DF}"/>
-              </a:ext>
-            </a:extLst>
-          </p:cNvPr>
+              <a:t>分析手法，実装技術など</a:t>
+            </a:r>
+            <a:endParaRPr lang="en-US" altLang="ja-JP" sz="5400" dirty="0"/>
+          </a:p>
+        </p:txBody>
+      </p:sp>
+      <p:sp>
+        <p:nvSpPr>
+          <p:cNvPr id="10" name="フッター プレースホルダー 9"/>
+          <p:cNvSpPr>
+            <a:spLocks noGrp="1"/>
+          </p:cNvSpPr>
+          <p:nvPr>
+            <p:ph type="ftr" sz="quarter" idx="11"/>
+          </p:nvPr>
+        </p:nvSpPr>
+        <p:spPr/>
+        <p:txBody>
+          <a:bodyPr/>
+          <a:lstStyle/>
+          <a:p>
+            <a:r>
+              <a:rPr kumimoji="1" lang="en-US" altLang="ja-JP"/>
+              <a:t>@Takato Matsumoto, 2020</a:t>
+            </a:r>
+            <a:endParaRPr kumimoji="1" lang="ja-JP" altLang="en-US" dirty="0"/>
+          </a:p>
+        </p:txBody>
+      </p:sp>
+      <p:sp>
+        <p:nvSpPr>
+          <p:cNvPr id="11" name="スライド番号プレースホルダー 10"/>
           <p:cNvSpPr>
             <a:spLocks noGrp="1"/>
           </p:cNvSpPr>
@@ -19581,39 +19767,82 @@
           </a:p>
         </p:txBody>
       </p:sp>
-      <p:sp>
-        <p:nvSpPr>
-          <p:cNvPr id="35" name="Footer Placeholder 34">
+      <p:pic>
+        <p:nvPicPr>
+          <p:cNvPr id="16" name="Picture Placeholder 15">
             <a:extLst>
               <a:ext uri="{FF2B5EF4-FFF2-40B4-BE49-F238E27FC236}">
-                <a16:creationId xmlns:a16="http://schemas.microsoft.com/office/drawing/2014/main" id="{9CA800DD-9063-F844-BBC3-914B9C2CF664}"/>
+                <a16:creationId xmlns:a16="http://schemas.microsoft.com/office/drawing/2014/main" id="{35C36191-2700-784D-8C53-5588D4E73F5B}"/>
               </a:ext>
             </a:extLst>
           </p:cNvPr>
-          <p:cNvSpPr>
-            <a:spLocks noGrp="1"/>
-          </p:cNvSpPr>
-          <p:nvPr>
-            <p:ph type="ftr" sz="quarter" idx="11"/>
-          </p:nvPr>
-        </p:nvSpPr>
-        <p:spPr/>
-        <p:txBody>
-          <a:bodyPr/>
+          <p:cNvPicPr>
+            <a:picLocks noGrp="1" noChangeAspect="1"/>
+          </p:cNvPicPr>
+          <p:nvPr>
+            <p:ph type="pic" sz="quarter" idx="12"/>
+          </p:nvPr>
+        </p:nvPicPr>
+        <p:blipFill rotWithShape="1">
+          <a:blip r:embed="rId2">
+            <a:extLst>
+              <a:ext uri="{28A0092B-C50C-407E-A947-70E740481C1C}">
+                <a14:useLocalDpi xmlns:a14="http://schemas.microsoft.com/office/drawing/2010/main" val="0"/>
+              </a:ext>
+            </a:extLst>
+          </a:blip>
+          <a:srcRect b="11548"/>
+          <a:stretch/>
+        </p:blipFill>
+        <p:spPr>
+          <a:xfrm>
+            <a:off x="0" y="0"/>
+            <a:ext cx="8197850" cy="10285413"/>
+          </a:xfrm>
+        </p:spPr>
+      </p:pic>
+      <p:sp>
+        <p:nvSpPr>
+          <p:cNvPr id="17" name="TextBox 16">
+            <a:extLst>
+              <a:ext uri="{FF2B5EF4-FFF2-40B4-BE49-F238E27FC236}">
+                <a16:creationId xmlns:a16="http://schemas.microsoft.com/office/drawing/2014/main" id="{28724D3E-BBA8-2148-B7C2-1475F22CA339}"/>
+              </a:ext>
+            </a:extLst>
+          </p:cNvPr>
+          <p:cNvSpPr txBox="1"/>
+          <p:nvPr/>
+        </p:nvSpPr>
+        <p:spPr>
+          <a:xfrm>
+            <a:off x="15959670" y="0"/>
+            <a:ext cx="2328330" cy="369332"/>
+          </a:xfrm>
+          <a:prstGeom prst="rect">
+            <a:avLst/>
+          </a:prstGeom>
+          <a:noFill/>
+        </p:spPr>
+        <p:txBody>
+          <a:bodyPr wrap="none" rtlCol="0">
+            <a:spAutoFit/>
+          </a:bodyPr>
           <a:lstStyle/>
           <a:p>
             <a:r>
-              <a:rPr kumimoji="1" lang="en-US" altLang="ja-JP"/>
-              <a:t>@Takato Matsumoto, 2020</a:t>
-            </a:r>
-            <a:endParaRPr kumimoji="1" lang="ja-JP" altLang="en-US" dirty="0"/>
+              <a:rPr lang="en-US" dirty="0">
+                <a:hlinkClick r:id="rId3"/>
+              </a:rPr>
+              <a:t>https://de.uec.ac.jp/</a:t>
+            </a:r>
+            <a:endParaRPr lang="en-US" dirty="0"/>
           </a:p>
         </p:txBody>
       </p:sp>
     </p:spTree>
     <p:extLst>
       <p:ext uri="{BB962C8B-B14F-4D97-AF65-F5344CB8AC3E}">
-        <p14:creationId xmlns:p14="http://schemas.microsoft.com/office/powerpoint/2010/main" val="1863008372"/>
+        <p14:creationId xmlns:p14="http://schemas.microsoft.com/office/powerpoint/2010/main" val="754355083"/>
       </p:ext>
     </p:extLst>
   </p:cSld>

</xml_diff>